<commit_message>
Menambahkan gambar cermin sferis
</commit_message>
<xml_diff>
--- a/Presentation1.pptx
+++ b/Presentation1.pptx
@@ -6,9 +6,12 @@
   </p:sldMasterIdLst>
   <p:sldIdLst>
     <p:sldId id="256" r:id="rId2"/>
-    <p:sldId id="257" r:id="rId3"/>
-    <p:sldId id="258" r:id="rId4"/>
-    <p:sldId id="259" r:id="rId5"/>
+    <p:sldId id="260" r:id="rId3"/>
+    <p:sldId id="262" r:id="rId4"/>
+    <p:sldId id="261" r:id="rId5"/>
+    <p:sldId id="257" r:id="rId6"/>
+    <p:sldId id="258" r:id="rId7"/>
+    <p:sldId id="259" r:id="rId8"/>
   </p:sldIdLst>
   <p:sldSz cx="12192000" cy="6858000"/>
   <p:notesSz cx="6858000" cy="9144000"/>
@@ -107,6 +110,11 @@
       </a:defRPr>
     </a:lvl9pPr>
   </p:defaultTextStyle>
+  <p:extLst>
+    <p:ext uri="{EFAFB233-063F-42B5-8137-9DF3F51BA10A}">
+      <p15:sldGuideLst xmlns:p15="http://schemas.microsoft.com/office/powerpoint/2012/main"/>
+    </p:ext>
+  </p:extLst>
 </p:presentation>
 </file>
 
@@ -259,7 +267,7 @@
           <a:p>
             <a:fld id="{A5358068-B55E-472E-8EF6-2EE20D143D55}" type="datetimeFigureOut">
               <a:rPr lang="en-ID" smtClean="0"/>
-              <a:t>04/08/2024</a:t>
+              <a:t>11/08/2024</a:t>
             </a:fld>
             <a:endParaRPr lang="en-ID"/>
           </a:p>
@@ -459,7 +467,7 @@
           <a:p>
             <a:fld id="{A5358068-B55E-472E-8EF6-2EE20D143D55}" type="datetimeFigureOut">
               <a:rPr lang="en-ID" smtClean="0"/>
-              <a:t>04/08/2024</a:t>
+              <a:t>11/08/2024</a:t>
             </a:fld>
             <a:endParaRPr lang="en-ID"/>
           </a:p>
@@ -669,7 +677,7 @@
           <a:p>
             <a:fld id="{A5358068-B55E-472E-8EF6-2EE20D143D55}" type="datetimeFigureOut">
               <a:rPr lang="en-ID" smtClean="0"/>
-              <a:t>04/08/2024</a:t>
+              <a:t>11/08/2024</a:t>
             </a:fld>
             <a:endParaRPr lang="en-ID"/>
           </a:p>
@@ -869,7 +877,7 @@
           <a:p>
             <a:fld id="{A5358068-B55E-472E-8EF6-2EE20D143D55}" type="datetimeFigureOut">
               <a:rPr lang="en-ID" smtClean="0"/>
-              <a:t>04/08/2024</a:t>
+              <a:t>11/08/2024</a:t>
             </a:fld>
             <a:endParaRPr lang="en-ID"/>
           </a:p>
@@ -1145,7 +1153,7 @@
           <a:p>
             <a:fld id="{A5358068-B55E-472E-8EF6-2EE20D143D55}" type="datetimeFigureOut">
               <a:rPr lang="en-ID" smtClean="0"/>
-              <a:t>04/08/2024</a:t>
+              <a:t>11/08/2024</a:t>
             </a:fld>
             <a:endParaRPr lang="en-ID"/>
           </a:p>
@@ -1413,7 +1421,7 @@
           <a:p>
             <a:fld id="{A5358068-B55E-472E-8EF6-2EE20D143D55}" type="datetimeFigureOut">
               <a:rPr lang="en-ID" smtClean="0"/>
-              <a:t>04/08/2024</a:t>
+              <a:t>11/08/2024</a:t>
             </a:fld>
             <a:endParaRPr lang="en-ID"/>
           </a:p>
@@ -1828,7 +1836,7 @@
           <a:p>
             <a:fld id="{A5358068-B55E-472E-8EF6-2EE20D143D55}" type="datetimeFigureOut">
               <a:rPr lang="en-ID" smtClean="0"/>
-              <a:t>04/08/2024</a:t>
+              <a:t>11/08/2024</a:t>
             </a:fld>
             <a:endParaRPr lang="en-ID"/>
           </a:p>
@@ -1970,7 +1978,7 @@
           <a:p>
             <a:fld id="{A5358068-B55E-472E-8EF6-2EE20D143D55}" type="datetimeFigureOut">
               <a:rPr lang="en-ID" smtClean="0"/>
-              <a:t>04/08/2024</a:t>
+              <a:t>11/08/2024</a:t>
             </a:fld>
             <a:endParaRPr lang="en-ID"/>
           </a:p>
@@ -2083,7 +2091,7 @@
           <a:p>
             <a:fld id="{A5358068-B55E-472E-8EF6-2EE20D143D55}" type="datetimeFigureOut">
               <a:rPr lang="en-ID" smtClean="0"/>
-              <a:t>04/08/2024</a:t>
+              <a:t>11/08/2024</a:t>
             </a:fld>
             <a:endParaRPr lang="en-ID"/>
           </a:p>
@@ -2396,7 +2404,7 @@
           <a:p>
             <a:fld id="{A5358068-B55E-472E-8EF6-2EE20D143D55}" type="datetimeFigureOut">
               <a:rPr lang="en-ID" smtClean="0"/>
-              <a:t>04/08/2024</a:t>
+              <a:t>11/08/2024</a:t>
             </a:fld>
             <a:endParaRPr lang="en-ID"/>
           </a:p>
@@ -2685,7 +2693,7 @@
           <a:p>
             <a:fld id="{A5358068-B55E-472E-8EF6-2EE20D143D55}" type="datetimeFigureOut">
               <a:rPr lang="en-ID" smtClean="0"/>
-              <a:t>04/08/2024</a:t>
+              <a:t>11/08/2024</a:t>
             </a:fld>
             <a:endParaRPr lang="en-ID"/>
           </a:p>
@@ -2928,7 +2936,7 @@
           <a:p>
             <a:fld id="{A5358068-B55E-472E-8EF6-2EE20D143D55}" type="datetimeFigureOut">
               <a:rPr lang="en-ID" smtClean="0"/>
-              <a:t>04/08/2024</a:t>
+              <a:t>11/08/2024</a:t>
             </a:fld>
             <a:endParaRPr lang="en-ID"/>
           </a:p>
@@ -3409,6 +3417,3085 @@
 </file>
 
 <file path=ppt/slides/slide2.xml><?xml version="1.0" encoding="utf-8"?>
+<p:sld xmlns:a="http://schemas.openxmlformats.org/drawingml/2006/main" xmlns:r="http://schemas.openxmlformats.org/officeDocument/2006/relationships" xmlns:p="http://schemas.openxmlformats.org/presentationml/2006/main">
+  <p:cSld>
+    <p:spTree>
+      <p:nvGrpSpPr>
+        <p:cNvPr id="1" name=""/>
+        <p:cNvGrpSpPr/>
+        <p:nvPr/>
+      </p:nvGrpSpPr>
+      <p:grpSpPr>
+        <a:xfrm>
+          <a:off x="0" y="0"/>
+          <a:ext cx="0" cy="0"/>
+          <a:chOff x="0" y="0"/>
+          <a:chExt cx="0" cy="0"/>
+        </a:xfrm>
+      </p:grpSpPr>
+      <p:grpSp>
+        <p:nvGrpSpPr>
+          <p:cNvPr id="2" name="Group 1">
+            <a:extLst>
+              <a:ext uri="{FF2B5EF4-FFF2-40B4-BE49-F238E27FC236}">
+                <a16:creationId xmlns:a16="http://schemas.microsoft.com/office/drawing/2014/main" id="{CB681B5C-C2AF-E68C-58D2-1A2BAB7EAFFD}"/>
+              </a:ext>
+            </a:extLst>
+          </p:cNvPr>
+          <p:cNvGrpSpPr/>
+          <p:nvPr/>
+        </p:nvGrpSpPr>
+        <p:grpSpPr>
+          <a:xfrm>
+            <a:off x="4843462" y="3049587"/>
+            <a:ext cx="5362575" cy="3097213"/>
+            <a:chOff x="3276600" y="3213100"/>
+            <a:chExt cx="5362575" cy="3097213"/>
+          </a:xfrm>
+        </p:grpSpPr>
+        <p:sp>
+          <p:nvSpPr>
+            <p:cNvPr id="3" name="Oval 13" descr="Dark upward diagonal">
+              <a:extLst>
+                <a:ext uri="{FF2B5EF4-FFF2-40B4-BE49-F238E27FC236}">
+                  <a16:creationId xmlns:a16="http://schemas.microsoft.com/office/drawing/2014/main" id="{D104BCAB-4EB3-11F8-6310-18D4564E0319}"/>
+                </a:ext>
+              </a:extLst>
+            </p:cNvPr>
+            <p:cNvSpPr>
+              <a:spLocks noChangeArrowheads="1"/>
+            </p:cNvSpPr>
+            <p:nvPr/>
+          </p:nvSpPr>
+          <p:spPr bwMode="auto">
+            <a:xfrm>
+              <a:off x="3276600" y="3213100"/>
+              <a:ext cx="3240088" cy="3097213"/>
+            </a:xfrm>
+            <a:prstGeom prst="ellipse">
+              <a:avLst/>
+            </a:prstGeom>
+            <a:pattFill prst="dkUpDiag">
+              <a:fgClr>
+                <a:schemeClr val="accent1"/>
+              </a:fgClr>
+              <a:bgClr>
+                <a:schemeClr val="bg1"/>
+              </a:bgClr>
+            </a:pattFill>
+            <a:ln w="9525">
+              <a:noFill/>
+              <a:round/>
+              <a:headEnd/>
+              <a:tailEnd/>
+            </a:ln>
+          </p:spPr>
+          <p:txBody>
+            <a:bodyPr wrap="none" anchor="ctr"/>
+            <a:lstStyle/>
+            <a:p>
+              <a:endParaRPr lang="id-ID" dirty="0"/>
+            </a:p>
+          </p:txBody>
+        </p:sp>
+        <p:grpSp>
+          <p:nvGrpSpPr>
+            <p:cNvPr id="4" name="Group 3">
+              <a:extLst>
+                <a:ext uri="{FF2B5EF4-FFF2-40B4-BE49-F238E27FC236}">
+                  <a16:creationId xmlns:a16="http://schemas.microsoft.com/office/drawing/2014/main" id="{F3215CCF-0DB4-EE9B-9769-B22266188F7E}"/>
+                </a:ext>
+              </a:extLst>
+            </p:cNvPr>
+            <p:cNvGrpSpPr/>
+            <p:nvPr/>
+          </p:nvGrpSpPr>
+          <p:grpSpPr>
+            <a:xfrm>
+              <a:off x="3419475" y="3357563"/>
+              <a:ext cx="5219700" cy="2809875"/>
+              <a:chOff x="3419475" y="3357563"/>
+              <a:chExt cx="5219700" cy="2809875"/>
+            </a:xfrm>
+          </p:grpSpPr>
+          <p:sp>
+            <p:nvSpPr>
+              <p:cNvPr id="5" name="Oval 14">
+                <a:extLst>
+                  <a:ext uri="{FF2B5EF4-FFF2-40B4-BE49-F238E27FC236}">
+                    <a16:creationId xmlns:a16="http://schemas.microsoft.com/office/drawing/2014/main" id="{A5E25769-BE25-8180-7FA9-63BAA1CCDE75}"/>
+                  </a:ext>
+                </a:extLst>
+              </p:cNvPr>
+              <p:cNvSpPr>
+                <a:spLocks noChangeArrowheads="1"/>
+              </p:cNvSpPr>
+              <p:nvPr/>
+            </p:nvSpPr>
+            <p:spPr bwMode="auto">
+              <a:xfrm>
+                <a:off x="3419475" y="3357563"/>
+                <a:ext cx="2952750" cy="2809875"/>
+              </a:xfrm>
+              <a:prstGeom prst="ellipse">
+                <a:avLst/>
+              </a:prstGeom>
+              <a:solidFill>
+                <a:schemeClr val="bg1"/>
+              </a:solidFill>
+              <a:ln w="9525">
+                <a:solidFill>
+                  <a:srgbClr val="660033"/>
+                </a:solidFill>
+                <a:round/>
+                <a:headEnd/>
+                <a:tailEnd/>
+              </a:ln>
+            </p:spPr>
+            <p:txBody>
+              <a:bodyPr wrap="none" anchor="ctr"/>
+              <a:lstStyle/>
+              <a:p>
+                <a:endParaRPr lang="id-ID"/>
+              </a:p>
+            </p:txBody>
+          </p:sp>
+          <p:sp>
+            <p:nvSpPr>
+              <p:cNvPr id="6" name="Oval 15">
+                <a:extLst>
+                  <a:ext uri="{FF2B5EF4-FFF2-40B4-BE49-F238E27FC236}">
+                    <a16:creationId xmlns:a16="http://schemas.microsoft.com/office/drawing/2014/main" id="{05D11EE7-6592-ECDE-2DE8-21E3866D6A26}"/>
+                  </a:ext>
+                </a:extLst>
+              </p:cNvPr>
+              <p:cNvSpPr>
+                <a:spLocks noChangeArrowheads="1"/>
+              </p:cNvSpPr>
+              <p:nvPr/>
+            </p:nvSpPr>
+            <p:spPr bwMode="auto">
+              <a:xfrm>
+                <a:off x="5940425" y="4221163"/>
+                <a:ext cx="792163" cy="792162"/>
+              </a:xfrm>
+              <a:prstGeom prst="ellipse">
+                <a:avLst/>
+              </a:prstGeom>
+              <a:solidFill>
+                <a:srgbClr val="BCE8F2">
+                  <a:alpha val="50980"/>
+                </a:srgbClr>
+              </a:solidFill>
+              <a:ln w="57150" cmpd="thinThick">
+                <a:solidFill>
+                  <a:schemeClr val="tx1"/>
+                </a:solidFill>
+                <a:round/>
+                <a:headEnd/>
+                <a:tailEnd/>
+              </a:ln>
+            </p:spPr>
+            <p:txBody>
+              <a:bodyPr wrap="none" anchor="ctr"/>
+              <a:lstStyle/>
+              <a:p>
+                <a:endParaRPr lang="id-ID"/>
+              </a:p>
+            </p:txBody>
+          </p:sp>
+          <p:grpSp>
+            <p:nvGrpSpPr>
+              <p:cNvPr id="7" name="Group 19">
+                <a:extLst>
+                  <a:ext uri="{FF2B5EF4-FFF2-40B4-BE49-F238E27FC236}">
+                    <a16:creationId xmlns:a16="http://schemas.microsoft.com/office/drawing/2014/main" id="{3B7DACAF-B545-D7BD-D47B-A1804E91DAAE}"/>
+                  </a:ext>
+                </a:extLst>
+              </p:cNvPr>
+              <p:cNvGrpSpPr>
+                <a:grpSpLocks/>
+              </p:cNvGrpSpPr>
+              <p:nvPr/>
+            </p:nvGrpSpPr>
+            <p:grpSpPr bwMode="auto">
+              <a:xfrm>
+                <a:off x="7956550" y="4292600"/>
+                <a:ext cx="682625" cy="936625"/>
+                <a:chOff x="2789" y="2704"/>
+                <a:chExt cx="430" cy="590"/>
+              </a:xfrm>
+            </p:grpSpPr>
+            <p:sp>
+              <p:nvSpPr>
+                <p:cNvPr id="10" name="Arc 17" descr="Dark downward diagonal">
+                  <a:extLst>
+                    <a:ext uri="{FF2B5EF4-FFF2-40B4-BE49-F238E27FC236}">
+                      <a16:creationId xmlns:a16="http://schemas.microsoft.com/office/drawing/2014/main" id="{E27AAAA2-CA5F-A7BA-58E5-4DCF21669836}"/>
+                    </a:ext>
+                  </a:extLst>
+                </p:cNvPr>
+                <p:cNvSpPr>
+                  <a:spLocks/>
+                </p:cNvSpPr>
+                <p:nvPr/>
+              </p:nvSpPr>
+              <p:spPr bwMode="auto">
+                <a:xfrm rot="2345067">
+                  <a:off x="2845" y="2704"/>
+                  <a:ext cx="374" cy="590"/>
+                </a:xfrm>
+                <a:custGeom>
+                  <a:avLst/>
+                  <a:gdLst>
+                    <a:gd name="T0" fmla="*/ 0 w 19744"/>
+                    <a:gd name="T1" fmla="*/ 0 h 21600"/>
+                    <a:gd name="T2" fmla="*/ 7 w 19744"/>
+                    <a:gd name="T3" fmla="*/ 10 h 21600"/>
+                    <a:gd name="T4" fmla="*/ 0 w 19744"/>
+                    <a:gd name="T5" fmla="*/ 16 h 21600"/>
+                    <a:gd name="T6" fmla="*/ 0 60000 65536"/>
+                    <a:gd name="T7" fmla="*/ 0 60000 65536"/>
+                    <a:gd name="T8" fmla="*/ 0 60000 65536"/>
+                    <a:gd name="T9" fmla="*/ 0 w 19744"/>
+                    <a:gd name="T10" fmla="*/ 0 h 21600"/>
+                    <a:gd name="T11" fmla="*/ 19744 w 19744"/>
+                    <a:gd name="T12" fmla="*/ 21600 h 21600"/>
+                  </a:gdLst>
+                  <a:ahLst/>
+                  <a:cxnLst>
+                    <a:cxn ang="T6">
+                      <a:pos x="T0" y="T1"/>
+                    </a:cxn>
+                    <a:cxn ang="T7">
+                      <a:pos x="T2" y="T3"/>
+                    </a:cxn>
+                    <a:cxn ang="T8">
+                      <a:pos x="T4" y="T5"/>
+                    </a:cxn>
+                  </a:cxnLst>
+                  <a:rect l="T9" t="T10" r="T11" b="T12"/>
+                  <a:pathLst>
+                    <a:path w="19744" h="21600" fill="none" extrusionOk="0">
+                      <a:moveTo>
+                        <a:pt x="-1" y="0"/>
+                      </a:moveTo>
+                      <a:cubicBezTo>
+                        <a:pt x="8541" y="0"/>
+                        <a:pt x="16280" y="5033"/>
+                        <a:pt x="19744" y="12840"/>
+                      </a:cubicBezTo>
+                    </a:path>
+                    <a:path w="19744" h="21600" stroke="0" extrusionOk="0">
+                      <a:moveTo>
+                        <a:pt x="-1" y="0"/>
+                      </a:moveTo>
+                      <a:cubicBezTo>
+                        <a:pt x="8541" y="0"/>
+                        <a:pt x="16280" y="5033"/>
+                        <a:pt x="19744" y="12840"/>
+                      </a:cubicBezTo>
+                      <a:lnTo>
+                        <a:pt x="0" y="21600"/>
+                      </a:lnTo>
+                      <a:close/>
+                    </a:path>
+                  </a:pathLst>
+                </a:custGeom>
+                <a:pattFill prst="dkDnDiag">
+                  <a:fgClr>
+                    <a:schemeClr val="accent1"/>
+                  </a:fgClr>
+                  <a:bgClr>
+                    <a:schemeClr val="bg1"/>
+                  </a:bgClr>
+                </a:pattFill>
+                <a:ln w="28575">
+                  <a:noFill/>
+                  <a:round/>
+                  <a:headEnd/>
+                  <a:tailEnd/>
+                </a:ln>
+              </p:spPr>
+              <p:txBody>
+                <a:bodyPr wrap="none" anchor="ctr"/>
+                <a:lstStyle/>
+                <a:p>
+                  <a:endParaRPr lang="id-ID" dirty="0"/>
+                </a:p>
+              </p:txBody>
+            </p:sp>
+            <p:sp>
+              <p:nvSpPr>
+                <p:cNvPr id="11" name="Arc 18">
+                  <a:extLst>
+                    <a:ext uri="{FF2B5EF4-FFF2-40B4-BE49-F238E27FC236}">
+                      <a16:creationId xmlns:a16="http://schemas.microsoft.com/office/drawing/2014/main" id="{A817D772-F44E-D0D8-BD81-6043138C619D}"/>
+                    </a:ext>
+                  </a:extLst>
+                </p:cNvPr>
+                <p:cNvSpPr>
+                  <a:spLocks/>
+                </p:cNvSpPr>
+                <p:nvPr/>
+              </p:nvSpPr>
+              <p:spPr bwMode="auto">
+                <a:xfrm rot="2345067">
+                  <a:off x="2789" y="2704"/>
+                  <a:ext cx="374" cy="590"/>
+                </a:xfrm>
+                <a:custGeom>
+                  <a:avLst/>
+                  <a:gdLst>
+                    <a:gd name="T0" fmla="*/ 0 w 19744"/>
+                    <a:gd name="T1" fmla="*/ 0 h 21600"/>
+                    <a:gd name="T2" fmla="*/ 7 w 19744"/>
+                    <a:gd name="T3" fmla="*/ 10 h 21600"/>
+                    <a:gd name="T4" fmla="*/ 0 w 19744"/>
+                    <a:gd name="T5" fmla="*/ 16 h 21600"/>
+                    <a:gd name="T6" fmla="*/ 0 60000 65536"/>
+                    <a:gd name="T7" fmla="*/ 0 60000 65536"/>
+                    <a:gd name="T8" fmla="*/ 0 60000 65536"/>
+                    <a:gd name="T9" fmla="*/ 0 w 19744"/>
+                    <a:gd name="T10" fmla="*/ 0 h 21600"/>
+                    <a:gd name="T11" fmla="*/ 19744 w 19744"/>
+                    <a:gd name="T12" fmla="*/ 21600 h 21600"/>
+                  </a:gdLst>
+                  <a:ahLst/>
+                  <a:cxnLst>
+                    <a:cxn ang="T6">
+                      <a:pos x="T0" y="T1"/>
+                    </a:cxn>
+                    <a:cxn ang="T7">
+                      <a:pos x="T2" y="T3"/>
+                    </a:cxn>
+                    <a:cxn ang="T8">
+                      <a:pos x="T4" y="T5"/>
+                    </a:cxn>
+                  </a:cxnLst>
+                  <a:rect l="T9" t="T10" r="T11" b="T12"/>
+                  <a:pathLst>
+                    <a:path w="19744" h="21600" fill="none" extrusionOk="0">
+                      <a:moveTo>
+                        <a:pt x="-1" y="0"/>
+                      </a:moveTo>
+                      <a:cubicBezTo>
+                        <a:pt x="8541" y="0"/>
+                        <a:pt x="16280" y="5033"/>
+                        <a:pt x="19744" y="12840"/>
+                      </a:cubicBezTo>
+                    </a:path>
+                    <a:path w="19744" h="21600" stroke="0" extrusionOk="0">
+                      <a:moveTo>
+                        <a:pt x="-1" y="0"/>
+                      </a:moveTo>
+                      <a:cubicBezTo>
+                        <a:pt x="8541" y="0"/>
+                        <a:pt x="16280" y="5033"/>
+                        <a:pt x="19744" y="12840"/>
+                      </a:cubicBezTo>
+                      <a:lnTo>
+                        <a:pt x="0" y="21600"/>
+                      </a:lnTo>
+                      <a:close/>
+                    </a:path>
+                  </a:pathLst>
+                </a:custGeom>
+                <a:solidFill>
+                  <a:schemeClr val="bg1"/>
+                </a:solidFill>
+                <a:ln w="28575">
+                  <a:solidFill>
+                    <a:schemeClr val="tx1"/>
+                  </a:solidFill>
+                  <a:round/>
+                  <a:headEnd/>
+                  <a:tailEnd/>
+                </a:ln>
+              </p:spPr>
+              <p:txBody>
+                <a:bodyPr wrap="none" anchor="ctr"/>
+                <a:lstStyle/>
+                <a:p>
+                  <a:endParaRPr lang="id-ID"/>
+                </a:p>
+              </p:txBody>
+            </p:sp>
+          </p:grpSp>
+          <p:sp>
+            <p:nvSpPr>
+              <p:cNvPr id="8" name="Line 23">
+                <a:extLst>
+                  <a:ext uri="{FF2B5EF4-FFF2-40B4-BE49-F238E27FC236}">
+                    <a16:creationId xmlns:a16="http://schemas.microsoft.com/office/drawing/2014/main" id="{A8343D38-3219-D3E9-63DA-C5C770FF22C4}"/>
+                  </a:ext>
+                </a:extLst>
+              </p:cNvPr>
+              <p:cNvSpPr>
+                <a:spLocks noChangeShapeType="1"/>
+              </p:cNvSpPr>
+              <p:nvPr/>
+            </p:nvSpPr>
+            <p:spPr bwMode="auto">
+              <a:xfrm>
+                <a:off x="6877050" y="4581525"/>
+                <a:ext cx="1511300" cy="0"/>
+              </a:xfrm>
+              <a:prstGeom prst="line">
+                <a:avLst/>
+              </a:prstGeom>
+              <a:noFill/>
+              <a:ln w="38100">
+                <a:solidFill>
+                  <a:srgbClr val="FF3300"/>
+                </a:solidFill>
+                <a:round/>
+                <a:headEnd/>
+                <a:tailEnd type="triangle" w="med" len="med"/>
+              </a:ln>
+            </p:spPr>
+            <p:txBody>
+              <a:bodyPr/>
+              <a:lstStyle/>
+              <a:p>
+                <a:endParaRPr lang="id-ID"/>
+              </a:p>
+            </p:txBody>
+          </p:sp>
+          <p:sp>
+            <p:nvSpPr>
+              <p:cNvPr id="9" name="Text Box 25">
+                <a:extLst>
+                  <a:ext uri="{FF2B5EF4-FFF2-40B4-BE49-F238E27FC236}">
+                    <a16:creationId xmlns:a16="http://schemas.microsoft.com/office/drawing/2014/main" id="{F230F033-6681-2629-7A91-AA1F4B8A4415}"/>
+                  </a:ext>
+                </a:extLst>
+              </p:cNvPr>
+              <p:cNvSpPr txBox="1">
+                <a:spLocks noChangeArrowheads="1"/>
+              </p:cNvSpPr>
+              <p:nvPr/>
+            </p:nvSpPr>
+            <p:spPr bwMode="auto">
+              <a:xfrm>
+                <a:off x="6804025" y="5157788"/>
+                <a:ext cx="1368425" cy="366712"/>
+              </a:xfrm>
+              <a:prstGeom prst="rect">
+                <a:avLst/>
+              </a:prstGeom>
+              <a:solidFill>
+                <a:srgbClr val="C6D8D2"/>
+              </a:solidFill>
+              <a:ln w="9525">
+                <a:noFill/>
+                <a:miter lim="800000"/>
+                <a:headEnd/>
+                <a:tailEnd/>
+              </a:ln>
+            </p:spPr>
+            <p:txBody>
+              <a:bodyPr>
+                <a:spAutoFit/>
+              </a:bodyPr>
+              <a:lstStyle/>
+              <a:p>
+                <a:pPr algn="ctr">
+                  <a:spcBef>
+                    <a:spcPct val="50000"/>
+                  </a:spcBef>
+                </a:pPr>
+                <a:r>
+                  <a:rPr lang="en-US" b="1"/>
+                  <a:t>Cekung </a:t>
+                </a:r>
+              </a:p>
+            </p:txBody>
+          </p:sp>
+        </p:grpSp>
+      </p:grpSp>
+      <p:grpSp>
+        <p:nvGrpSpPr>
+          <p:cNvPr id="12" name="Group 11">
+            <a:extLst>
+              <a:ext uri="{FF2B5EF4-FFF2-40B4-BE49-F238E27FC236}">
+                <a16:creationId xmlns:a16="http://schemas.microsoft.com/office/drawing/2014/main" id="{DB8B1D7D-22FC-2E24-11BA-DC5BD8AB29FF}"/>
+              </a:ext>
+            </a:extLst>
+          </p:cNvPr>
+          <p:cNvGrpSpPr/>
+          <p:nvPr/>
+        </p:nvGrpSpPr>
+        <p:grpSpPr>
+          <a:xfrm>
+            <a:off x="1478756" y="275430"/>
+            <a:ext cx="6820694" cy="3097213"/>
+            <a:chOff x="704056" y="256911"/>
+            <a:chExt cx="6820694" cy="3097213"/>
+          </a:xfrm>
+        </p:grpSpPr>
+        <p:grpSp>
+          <p:nvGrpSpPr>
+            <p:cNvPr id="13" name="Group 5">
+              <a:extLst>
+                <a:ext uri="{FF2B5EF4-FFF2-40B4-BE49-F238E27FC236}">
+                  <a16:creationId xmlns:a16="http://schemas.microsoft.com/office/drawing/2014/main" id="{70E153C3-44F8-CF05-504E-F8F22A13BA74}"/>
+                </a:ext>
+              </a:extLst>
+            </p:cNvPr>
+            <p:cNvGrpSpPr>
+              <a:grpSpLocks/>
+            </p:cNvGrpSpPr>
+            <p:nvPr/>
+          </p:nvGrpSpPr>
+          <p:grpSpPr bwMode="auto">
+            <a:xfrm>
+              <a:off x="704056" y="256911"/>
+              <a:ext cx="4570413" cy="3097213"/>
+              <a:chOff x="1837" y="2069"/>
+              <a:chExt cx="2879" cy="1951"/>
+            </a:xfrm>
+          </p:grpSpPr>
+          <p:sp>
+            <p:nvSpPr>
+              <p:cNvPr id="16" name="Oval 6" descr="Dark upward diagonal">
+                <a:extLst>
+                  <a:ext uri="{FF2B5EF4-FFF2-40B4-BE49-F238E27FC236}">
+                    <a16:creationId xmlns:a16="http://schemas.microsoft.com/office/drawing/2014/main" id="{4F2F06F0-33C6-EDCB-B115-A840A6F3B56F}"/>
+                  </a:ext>
+                </a:extLst>
+              </p:cNvPr>
+              <p:cNvSpPr>
+                <a:spLocks noChangeArrowheads="1"/>
+              </p:cNvSpPr>
+              <p:nvPr/>
+            </p:nvSpPr>
+            <p:spPr bwMode="auto">
+              <a:xfrm>
+                <a:off x="1837" y="2069"/>
+                <a:ext cx="2041" cy="1951"/>
+              </a:xfrm>
+              <a:prstGeom prst="ellipse">
+                <a:avLst/>
+              </a:prstGeom>
+              <a:pattFill prst="dkUpDiag">
+                <a:fgClr>
+                  <a:schemeClr val="accent1"/>
+                </a:fgClr>
+                <a:bgClr>
+                  <a:schemeClr val="bg1"/>
+                </a:bgClr>
+              </a:pattFill>
+              <a:ln w="9525">
+                <a:solidFill>
+                  <a:srgbClr val="885677"/>
+                </a:solidFill>
+                <a:round/>
+                <a:headEnd/>
+                <a:tailEnd/>
+              </a:ln>
+            </p:spPr>
+            <p:txBody>
+              <a:bodyPr wrap="none" anchor="ctr"/>
+              <a:lstStyle/>
+              <a:p>
+                <a:endParaRPr lang="id-ID"/>
+              </a:p>
+            </p:txBody>
+          </p:sp>
+          <p:sp>
+            <p:nvSpPr>
+              <p:cNvPr id="17" name="Oval 7">
+                <a:extLst>
+                  <a:ext uri="{FF2B5EF4-FFF2-40B4-BE49-F238E27FC236}">
+                    <a16:creationId xmlns:a16="http://schemas.microsoft.com/office/drawing/2014/main" id="{107DBBFD-60A8-3EA2-A0EE-581076AF769C}"/>
+                  </a:ext>
+                </a:extLst>
+              </p:cNvPr>
+              <p:cNvSpPr>
+                <a:spLocks noChangeArrowheads="1"/>
+              </p:cNvSpPr>
+              <p:nvPr/>
+            </p:nvSpPr>
+            <p:spPr bwMode="auto">
+              <a:xfrm>
+                <a:off x="1927" y="2160"/>
+                <a:ext cx="1860" cy="1770"/>
+              </a:xfrm>
+              <a:prstGeom prst="ellipse">
+                <a:avLst/>
+              </a:prstGeom>
+              <a:solidFill>
+                <a:schemeClr val="bg1"/>
+              </a:solidFill>
+              <a:ln w="9525">
+                <a:noFill/>
+                <a:round/>
+                <a:headEnd/>
+                <a:tailEnd/>
+              </a:ln>
+            </p:spPr>
+            <p:txBody>
+              <a:bodyPr wrap="none" anchor="ctr"/>
+              <a:lstStyle/>
+              <a:p>
+                <a:endParaRPr lang="id-ID"/>
+              </a:p>
+            </p:txBody>
+          </p:sp>
+          <p:sp>
+            <p:nvSpPr>
+              <p:cNvPr id="18" name="Oval 8">
+                <a:extLst>
+                  <a:ext uri="{FF2B5EF4-FFF2-40B4-BE49-F238E27FC236}">
+                    <a16:creationId xmlns:a16="http://schemas.microsoft.com/office/drawing/2014/main" id="{C5E5364A-1B68-447F-2877-F6B113E07AE8}"/>
+                  </a:ext>
+                </a:extLst>
+              </p:cNvPr>
+              <p:cNvSpPr>
+                <a:spLocks noChangeArrowheads="1"/>
+              </p:cNvSpPr>
+              <p:nvPr/>
+            </p:nvSpPr>
+            <p:spPr bwMode="auto">
+              <a:xfrm>
+                <a:off x="3515" y="2704"/>
+                <a:ext cx="499" cy="499"/>
+              </a:xfrm>
+              <a:prstGeom prst="ellipse">
+                <a:avLst/>
+              </a:prstGeom>
+              <a:solidFill>
+                <a:srgbClr val="BCE8F2">
+                  <a:alpha val="50980"/>
+                </a:srgbClr>
+              </a:solidFill>
+              <a:ln w="57150" cmpd="thinThick">
+                <a:solidFill>
+                  <a:schemeClr val="tx1"/>
+                </a:solidFill>
+                <a:round/>
+                <a:headEnd/>
+                <a:tailEnd/>
+              </a:ln>
+            </p:spPr>
+            <p:txBody>
+              <a:bodyPr wrap="none" anchor="ctr"/>
+              <a:lstStyle/>
+              <a:p>
+                <a:endParaRPr lang="id-ID"/>
+              </a:p>
+            </p:txBody>
+          </p:sp>
+          <p:grpSp>
+            <p:nvGrpSpPr>
+              <p:cNvPr id="19" name="Group 9">
+                <a:extLst>
+                  <a:ext uri="{FF2B5EF4-FFF2-40B4-BE49-F238E27FC236}">
+                    <a16:creationId xmlns:a16="http://schemas.microsoft.com/office/drawing/2014/main" id="{AD4EB55F-03CB-F624-02A0-B34D6494BE43}"/>
+                  </a:ext>
+                </a:extLst>
+              </p:cNvPr>
+              <p:cNvGrpSpPr>
+                <a:grpSpLocks/>
+              </p:cNvGrpSpPr>
+              <p:nvPr/>
+            </p:nvGrpSpPr>
+            <p:grpSpPr bwMode="auto">
+              <a:xfrm>
+                <a:off x="4286" y="2749"/>
+                <a:ext cx="430" cy="590"/>
+                <a:chOff x="4638" y="2432"/>
+                <a:chExt cx="430" cy="590"/>
+              </a:xfrm>
+            </p:grpSpPr>
+            <p:sp>
+              <p:nvSpPr>
+                <p:cNvPr id="20" name="Arc 10" descr="Dark downward diagonal">
+                  <a:extLst>
+                    <a:ext uri="{FF2B5EF4-FFF2-40B4-BE49-F238E27FC236}">
+                      <a16:creationId xmlns:a16="http://schemas.microsoft.com/office/drawing/2014/main" id="{74AA8B51-7DA9-E205-C733-52DC43915386}"/>
+                    </a:ext>
+                  </a:extLst>
+                </p:cNvPr>
+                <p:cNvSpPr>
+                  <a:spLocks/>
+                </p:cNvSpPr>
+                <p:nvPr/>
+              </p:nvSpPr>
+              <p:spPr bwMode="auto">
+                <a:xfrm rot="2345067">
+                  <a:off x="4694" y="2432"/>
+                  <a:ext cx="374" cy="590"/>
+                </a:xfrm>
+                <a:custGeom>
+                  <a:avLst/>
+                  <a:gdLst>
+                    <a:gd name="T0" fmla="*/ 0 w 19744"/>
+                    <a:gd name="T1" fmla="*/ 0 h 21600"/>
+                    <a:gd name="T2" fmla="*/ 7 w 19744"/>
+                    <a:gd name="T3" fmla="*/ 10 h 21600"/>
+                    <a:gd name="T4" fmla="*/ 0 w 19744"/>
+                    <a:gd name="T5" fmla="*/ 16 h 21600"/>
+                    <a:gd name="T6" fmla="*/ 0 60000 65536"/>
+                    <a:gd name="T7" fmla="*/ 0 60000 65536"/>
+                    <a:gd name="T8" fmla="*/ 0 60000 65536"/>
+                    <a:gd name="T9" fmla="*/ 0 w 19744"/>
+                    <a:gd name="T10" fmla="*/ 0 h 21600"/>
+                    <a:gd name="T11" fmla="*/ 19744 w 19744"/>
+                    <a:gd name="T12" fmla="*/ 21600 h 21600"/>
+                  </a:gdLst>
+                  <a:ahLst/>
+                  <a:cxnLst>
+                    <a:cxn ang="T6">
+                      <a:pos x="T0" y="T1"/>
+                    </a:cxn>
+                    <a:cxn ang="T7">
+                      <a:pos x="T2" y="T3"/>
+                    </a:cxn>
+                    <a:cxn ang="T8">
+                      <a:pos x="T4" y="T5"/>
+                    </a:cxn>
+                  </a:cxnLst>
+                  <a:rect l="T9" t="T10" r="T11" b="T12"/>
+                  <a:pathLst>
+                    <a:path w="19744" h="21600" fill="none" extrusionOk="0">
+                      <a:moveTo>
+                        <a:pt x="-1" y="0"/>
+                      </a:moveTo>
+                      <a:cubicBezTo>
+                        <a:pt x="8541" y="0"/>
+                        <a:pt x="16280" y="5033"/>
+                        <a:pt x="19744" y="12840"/>
+                      </a:cubicBezTo>
+                    </a:path>
+                    <a:path w="19744" h="21600" stroke="0" extrusionOk="0">
+                      <a:moveTo>
+                        <a:pt x="-1" y="0"/>
+                      </a:moveTo>
+                      <a:cubicBezTo>
+                        <a:pt x="8541" y="0"/>
+                        <a:pt x="16280" y="5033"/>
+                        <a:pt x="19744" y="12840"/>
+                      </a:cubicBezTo>
+                      <a:lnTo>
+                        <a:pt x="0" y="21600"/>
+                      </a:lnTo>
+                      <a:close/>
+                    </a:path>
+                  </a:pathLst>
+                </a:custGeom>
+                <a:pattFill prst="dkDnDiag">
+                  <a:fgClr>
+                    <a:srgbClr val="0070C0"/>
+                  </a:fgClr>
+                  <a:bgClr>
+                    <a:schemeClr val="bg1"/>
+                  </a:bgClr>
+                </a:pattFill>
+                <a:ln w="28575">
+                  <a:solidFill>
+                    <a:schemeClr val="tx1"/>
+                  </a:solidFill>
+                  <a:round/>
+                  <a:headEnd/>
+                  <a:tailEnd/>
+                </a:ln>
+              </p:spPr>
+              <p:txBody>
+                <a:bodyPr wrap="none" anchor="ctr"/>
+                <a:lstStyle/>
+                <a:p>
+                  <a:endParaRPr lang="id-ID"/>
+                </a:p>
+              </p:txBody>
+            </p:sp>
+            <p:sp>
+              <p:nvSpPr>
+                <p:cNvPr id="21" name="Arc 11">
+                  <a:extLst>
+                    <a:ext uri="{FF2B5EF4-FFF2-40B4-BE49-F238E27FC236}">
+                      <a16:creationId xmlns:a16="http://schemas.microsoft.com/office/drawing/2014/main" id="{5E1176D9-18A8-9874-112A-2423B25A43A6}"/>
+                    </a:ext>
+                  </a:extLst>
+                </p:cNvPr>
+                <p:cNvSpPr>
+                  <a:spLocks/>
+                </p:cNvSpPr>
+                <p:nvPr/>
+              </p:nvSpPr>
+              <p:spPr bwMode="auto">
+                <a:xfrm rot="2345067">
+                  <a:off x="4638" y="2432"/>
+                  <a:ext cx="374" cy="590"/>
+                </a:xfrm>
+                <a:custGeom>
+                  <a:avLst/>
+                  <a:gdLst>
+                    <a:gd name="T0" fmla="*/ 0 w 19744"/>
+                    <a:gd name="T1" fmla="*/ 0 h 21600"/>
+                    <a:gd name="T2" fmla="*/ 7 w 19744"/>
+                    <a:gd name="T3" fmla="*/ 10 h 21600"/>
+                    <a:gd name="T4" fmla="*/ 0 w 19744"/>
+                    <a:gd name="T5" fmla="*/ 16 h 21600"/>
+                    <a:gd name="T6" fmla="*/ 0 60000 65536"/>
+                    <a:gd name="T7" fmla="*/ 0 60000 65536"/>
+                    <a:gd name="T8" fmla="*/ 0 60000 65536"/>
+                    <a:gd name="T9" fmla="*/ 0 w 19744"/>
+                    <a:gd name="T10" fmla="*/ 0 h 21600"/>
+                    <a:gd name="T11" fmla="*/ 19744 w 19744"/>
+                    <a:gd name="T12" fmla="*/ 21600 h 21600"/>
+                  </a:gdLst>
+                  <a:ahLst/>
+                  <a:cxnLst>
+                    <a:cxn ang="T6">
+                      <a:pos x="T0" y="T1"/>
+                    </a:cxn>
+                    <a:cxn ang="T7">
+                      <a:pos x="T2" y="T3"/>
+                    </a:cxn>
+                    <a:cxn ang="T8">
+                      <a:pos x="T4" y="T5"/>
+                    </a:cxn>
+                  </a:cxnLst>
+                  <a:rect l="T9" t="T10" r="T11" b="T12"/>
+                  <a:pathLst>
+                    <a:path w="19744" h="21600" fill="none" extrusionOk="0">
+                      <a:moveTo>
+                        <a:pt x="-1" y="0"/>
+                      </a:moveTo>
+                      <a:cubicBezTo>
+                        <a:pt x="8541" y="0"/>
+                        <a:pt x="16280" y="5033"/>
+                        <a:pt x="19744" y="12840"/>
+                      </a:cubicBezTo>
+                    </a:path>
+                    <a:path w="19744" h="21600" stroke="0" extrusionOk="0">
+                      <a:moveTo>
+                        <a:pt x="-1" y="0"/>
+                      </a:moveTo>
+                      <a:cubicBezTo>
+                        <a:pt x="8541" y="0"/>
+                        <a:pt x="16280" y="5033"/>
+                        <a:pt x="19744" y="12840"/>
+                      </a:cubicBezTo>
+                      <a:lnTo>
+                        <a:pt x="0" y="21600"/>
+                      </a:lnTo>
+                      <a:close/>
+                    </a:path>
+                  </a:pathLst>
+                </a:custGeom>
+                <a:solidFill>
+                  <a:schemeClr val="bg1"/>
+                </a:solidFill>
+                <a:ln w="9525">
+                  <a:noFill/>
+                  <a:round/>
+                  <a:headEnd/>
+                  <a:tailEnd/>
+                </a:ln>
+              </p:spPr>
+              <p:txBody>
+                <a:bodyPr wrap="none" anchor="ctr"/>
+                <a:lstStyle/>
+                <a:p>
+                  <a:endParaRPr lang="id-ID"/>
+                </a:p>
+              </p:txBody>
+            </p:sp>
+          </p:grpSp>
+        </p:grpSp>
+        <p:sp>
+          <p:nvSpPr>
+            <p:cNvPr id="14" name="Line 21">
+              <a:extLst>
+                <a:ext uri="{FF2B5EF4-FFF2-40B4-BE49-F238E27FC236}">
+                  <a16:creationId xmlns:a16="http://schemas.microsoft.com/office/drawing/2014/main" id="{29DE157B-0534-CB93-9244-2F73572BBE9E}"/>
+                </a:ext>
+              </a:extLst>
+            </p:cNvPr>
+            <p:cNvSpPr>
+              <a:spLocks noChangeShapeType="1"/>
+            </p:cNvSpPr>
+            <p:nvPr/>
+          </p:nvSpPr>
+          <p:spPr bwMode="auto">
+            <a:xfrm flipH="1">
+              <a:off x="5651500" y="1628775"/>
+              <a:ext cx="1873250" cy="0"/>
+            </a:xfrm>
+            <a:prstGeom prst="line">
+              <a:avLst/>
+            </a:prstGeom>
+            <a:noFill/>
+            <a:ln w="38100">
+              <a:solidFill>
+                <a:srgbClr val="FF3300"/>
+              </a:solidFill>
+              <a:round/>
+              <a:headEnd/>
+              <a:tailEnd type="triangle" w="med" len="med"/>
+            </a:ln>
+          </p:spPr>
+          <p:txBody>
+            <a:bodyPr/>
+            <a:lstStyle/>
+            <a:p>
+              <a:endParaRPr lang="id-ID"/>
+            </a:p>
+          </p:txBody>
+        </p:sp>
+        <p:sp>
+          <p:nvSpPr>
+            <p:cNvPr id="15" name="Text Box 24">
+              <a:extLst>
+                <a:ext uri="{FF2B5EF4-FFF2-40B4-BE49-F238E27FC236}">
+                  <a16:creationId xmlns:a16="http://schemas.microsoft.com/office/drawing/2014/main" id="{84FBC1C8-CE48-97A7-ABEB-35B152DFF738}"/>
+                </a:ext>
+              </a:extLst>
+            </p:cNvPr>
+            <p:cNvSpPr txBox="1">
+              <a:spLocks noChangeArrowheads="1"/>
+            </p:cNvSpPr>
+            <p:nvPr/>
+          </p:nvSpPr>
+          <p:spPr bwMode="auto">
+            <a:xfrm>
+              <a:off x="5867400" y="1989138"/>
+              <a:ext cx="1368425" cy="366712"/>
+            </a:xfrm>
+            <a:prstGeom prst="rect">
+              <a:avLst/>
+            </a:prstGeom>
+            <a:solidFill>
+              <a:srgbClr val="C6D8D2"/>
+            </a:solidFill>
+            <a:ln w="9525">
+              <a:noFill/>
+              <a:miter lim="800000"/>
+              <a:headEnd/>
+              <a:tailEnd/>
+            </a:ln>
+          </p:spPr>
+          <p:txBody>
+            <a:bodyPr>
+              <a:spAutoFit/>
+            </a:bodyPr>
+            <a:lstStyle/>
+            <a:p>
+              <a:pPr algn="ctr">
+                <a:spcBef>
+                  <a:spcPct val="50000"/>
+                </a:spcBef>
+              </a:pPr>
+              <a:r>
+                <a:rPr lang="en-US" b="1"/>
+                <a:t>Cembung </a:t>
+              </a:r>
+            </a:p>
+          </p:txBody>
+        </p:sp>
+      </p:grpSp>
+    </p:spTree>
+    <p:extLst>
+      <p:ext uri="{BB962C8B-B14F-4D97-AF65-F5344CB8AC3E}">
+        <p14:creationId xmlns:p14="http://schemas.microsoft.com/office/powerpoint/2010/main" val="2612181318"/>
+      </p:ext>
+    </p:extLst>
+  </p:cSld>
+  <p:clrMapOvr>
+    <a:masterClrMapping/>
+  </p:clrMapOvr>
+</p:sld>
+</file>
+
+<file path=ppt/slides/slide3.xml><?xml version="1.0" encoding="utf-8"?>
+<p:sld xmlns:a="http://schemas.openxmlformats.org/drawingml/2006/main" xmlns:r="http://schemas.openxmlformats.org/officeDocument/2006/relationships" xmlns:p="http://schemas.openxmlformats.org/presentationml/2006/main">
+  <p:cSld>
+    <p:spTree>
+      <p:nvGrpSpPr>
+        <p:cNvPr id="1" name=""/>
+        <p:cNvGrpSpPr/>
+        <p:nvPr/>
+      </p:nvGrpSpPr>
+      <p:grpSpPr>
+        <a:xfrm>
+          <a:off x="0" y="0"/>
+          <a:ext cx="0" cy="0"/>
+          <a:chOff x="0" y="0"/>
+          <a:chExt cx="0" cy="0"/>
+        </a:xfrm>
+      </p:grpSpPr>
+      <p:grpSp>
+        <p:nvGrpSpPr>
+          <p:cNvPr id="29" name="Group 28">
+            <a:extLst>
+              <a:ext uri="{FF2B5EF4-FFF2-40B4-BE49-F238E27FC236}">
+                <a16:creationId xmlns:a16="http://schemas.microsoft.com/office/drawing/2014/main" id="{88E9A95A-2671-E761-628F-F96309D52E00}"/>
+              </a:ext>
+            </a:extLst>
+          </p:cNvPr>
+          <p:cNvGrpSpPr/>
+          <p:nvPr/>
+        </p:nvGrpSpPr>
+        <p:grpSpPr>
+          <a:xfrm>
+            <a:off x="1657431" y="1213711"/>
+            <a:ext cx="7531168" cy="3900062"/>
+            <a:chOff x="1657431" y="1213711"/>
+            <a:chExt cx="7531168" cy="3900062"/>
+          </a:xfrm>
+        </p:grpSpPr>
+        <p:grpSp>
+          <p:nvGrpSpPr>
+            <p:cNvPr id="26" name="Group 25">
+              <a:extLst>
+                <a:ext uri="{FF2B5EF4-FFF2-40B4-BE49-F238E27FC236}">
+                  <a16:creationId xmlns:a16="http://schemas.microsoft.com/office/drawing/2014/main" id="{6088C532-6EC5-595F-A717-A6353F7086D9}"/>
+                </a:ext>
+              </a:extLst>
+            </p:cNvPr>
+            <p:cNvGrpSpPr/>
+            <p:nvPr/>
+          </p:nvGrpSpPr>
+          <p:grpSpPr>
+            <a:xfrm>
+              <a:off x="1657431" y="1755227"/>
+              <a:ext cx="6664512" cy="3358546"/>
+              <a:chOff x="1657431" y="1755227"/>
+              <a:chExt cx="6664512" cy="3358546"/>
+            </a:xfrm>
+          </p:grpSpPr>
+          <p:grpSp>
+            <p:nvGrpSpPr>
+              <p:cNvPr id="7" name="Group 19">
+                <a:extLst>
+                  <a:ext uri="{FF2B5EF4-FFF2-40B4-BE49-F238E27FC236}">
+                    <a16:creationId xmlns:a16="http://schemas.microsoft.com/office/drawing/2014/main" id="{3B7DACAF-B545-D7BD-D47B-A1804E91DAAE}"/>
+                  </a:ext>
+                </a:extLst>
+              </p:cNvPr>
+              <p:cNvGrpSpPr>
+                <a:grpSpLocks/>
+              </p:cNvGrpSpPr>
+              <p:nvPr/>
+            </p:nvGrpSpPr>
+            <p:grpSpPr bwMode="auto">
+              <a:xfrm>
+                <a:off x="6092905" y="1986390"/>
+                <a:ext cx="631825" cy="944563"/>
+                <a:chOff x="2821" y="2704"/>
+                <a:chExt cx="398" cy="595"/>
+              </a:xfrm>
+            </p:grpSpPr>
+            <p:sp>
+              <p:nvSpPr>
+                <p:cNvPr id="10" name="Arc 17" descr="Dark downward diagonal">
+                  <a:extLst>
+                    <a:ext uri="{FF2B5EF4-FFF2-40B4-BE49-F238E27FC236}">
+                      <a16:creationId xmlns:a16="http://schemas.microsoft.com/office/drawing/2014/main" id="{E27AAAA2-CA5F-A7BA-58E5-4DCF21669836}"/>
+                    </a:ext>
+                  </a:extLst>
+                </p:cNvPr>
+                <p:cNvSpPr>
+                  <a:spLocks/>
+                </p:cNvSpPr>
+                <p:nvPr/>
+              </p:nvSpPr>
+              <p:spPr bwMode="auto">
+                <a:xfrm rot="2345067">
+                  <a:off x="2845" y="2704"/>
+                  <a:ext cx="374" cy="590"/>
+                </a:xfrm>
+                <a:custGeom>
+                  <a:avLst/>
+                  <a:gdLst>
+                    <a:gd name="T0" fmla="*/ 0 w 19744"/>
+                    <a:gd name="T1" fmla="*/ 0 h 21600"/>
+                    <a:gd name="T2" fmla="*/ 7 w 19744"/>
+                    <a:gd name="T3" fmla="*/ 10 h 21600"/>
+                    <a:gd name="T4" fmla="*/ 0 w 19744"/>
+                    <a:gd name="T5" fmla="*/ 16 h 21600"/>
+                    <a:gd name="T6" fmla="*/ 0 60000 65536"/>
+                    <a:gd name="T7" fmla="*/ 0 60000 65536"/>
+                    <a:gd name="T8" fmla="*/ 0 60000 65536"/>
+                    <a:gd name="T9" fmla="*/ 0 w 19744"/>
+                    <a:gd name="T10" fmla="*/ 0 h 21600"/>
+                    <a:gd name="T11" fmla="*/ 19744 w 19744"/>
+                    <a:gd name="T12" fmla="*/ 21600 h 21600"/>
+                  </a:gdLst>
+                  <a:ahLst/>
+                  <a:cxnLst>
+                    <a:cxn ang="T6">
+                      <a:pos x="T0" y="T1"/>
+                    </a:cxn>
+                    <a:cxn ang="T7">
+                      <a:pos x="T2" y="T3"/>
+                    </a:cxn>
+                    <a:cxn ang="T8">
+                      <a:pos x="T4" y="T5"/>
+                    </a:cxn>
+                  </a:cxnLst>
+                  <a:rect l="T9" t="T10" r="T11" b="T12"/>
+                  <a:pathLst>
+                    <a:path w="19744" h="21600" fill="none" extrusionOk="0">
+                      <a:moveTo>
+                        <a:pt x="-1" y="0"/>
+                      </a:moveTo>
+                      <a:cubicBezTo>
+                        <a:pt x="8541" y="0"/>
+                        <a:pt x="16280" y="5033"/>
+                        <a:pt x="19744" y="12840"/>
+                      </a:cubicBezTo>
+                    </a:path>
+                    <a:path w="19744" h="21600" stroke="0" extrusionOk="0">
+                      <a:moveTo>
+                        <a:pt x="-1" y="0"/>
+                      </a:moveTo>
+                      <a:cubicBezTo>
+                        <a:pt x="8541" y="0"/>
+                        <a:pt x="16280" y="5033"/>
+                        <a:pt x="19744" y="12840"/>
+                      </a:cubicBezTo>
+                      <a:lnTo>
+                        <a:pt x="0" y="21600"/>
+                      </a:lnTo>
+                      <a:close/>
+                    </a:path>
+                  </a:pathLst>
+                </a:custGeom>
+                <a:pattFill prst="dkUpDiag">
+                  <a:fgClr>
+                    <a:schemeClr val="accent1"/>
+                  </a:fgClr>
+                  <a:bgClr>
+                    <a:schemeClr val="bg1"/>
+                  </a:bgClr>
+                </a:pattFill>
+                <a:ln w="28575">
+                  <a:noFill/>
+                  <a:round/>
+                  <a:headEnd/>
+                  <a:tailEnd/>
+                </a:ln>
+              </p:spPr>
+              <p:txBody>
+                <a:bodyPr wrap="none" anchor="ctr"/>
+                <a:lstStyle/>
+                <a:p>
+                  <a:endParaRPr lang="id-ID" dirty="0"/>
+                </a:p>
+              </p:txBody>
+            </p:sp>
+            <p:sp>
+              <p:nvSpPr>
+                <p:cNvPr id="11" name="Arc 18">
+                  <a:extLst>
+                    <a:ext uri="{FF2B5EF4-FFF2-40B4-BE49-F238E27FC236}">
+                      <a16:creationId xmlns:a16="http://schemas.microsoft.com/office/drawing/2014/main" id="{A817D772-F44E-D0D8-BD81-6043138C619D}"/>
+                    </a:ext>
+                  </a:extLst>
+                </p:cNvPr>
+                <p:cNvSpPr>
+                  <a:spLocks/>
+                </p:cNvSpPr>
+                <p:nvPr/>
+              </p:nvSpPr>
+              <p:spPr bwMode="auto">
+                <a:xfrm rot="2345067">
+                  <a:off x="2821" y="2730"/>
+                  <a:ext cx="323" cy="569"/>
+                </a:xfrm>
+                <a:custGeom>
+                  <a:avLst/>
+                  <a:gdLst>
+                    <a:gd name="T0" fmla="*/ 0 w 19744"/>
+                    <a:gd name="T1" fmla="*/ 0 h 21600"/>
+                    <a:gd name="T2" fmla="*/ 7 w 19744"/>
+                    <a:gd name="T3" fmla="*/ 10 h 21600"/>
+                    <a:gd name="T4" fmla="*/ 0 w 19744"/>
+                    <a:gd name="T5" fmla="*/ 16 h 21600"/>
+                    <a:gd name="T6" fmla="*/ 0 60000 65536"/>
+                    <a:gd name="T7" fmla="*/ 0 60000 65536"/>
+                    <a:gd name="T8" fmla="*/ 0 60000 65536"/>
+                    <a:gd name="T9" fmla="*/ 0 w 19744"/>
+                    <a:gd name="T10" fmla="*/ 0 h 21600"/>
+                    <a:gd name="T11" fmla="*/ 19744 w 19744"/>
+                    <a:gd name="T12" fmla="*/ 21600 h 21600"/>
+                  </a:gdLst>
+                  <a:ahLst/>
+                  <a:cxnLst>
+                    <a:cxn ang="T6">
+                      <a:pos x="T0" y="T1"/>
+                    </a:cxn>
+                    <a:cxn ang="T7">
+                      <a:pos x="T2" y="T3"/>
+                    </a:cxn>
+                    <a:cxn ang="T8">
+                      <a:pos x="T4" y="T5"/>
+                    </a:cxn>
+                  </a:cxnLst>
+                  <a:rect l="T9" t="T10" r="T11" b="T12"/>
+                  <a:pathLst>
+                    <a:path w="19744" h="21600" fill="none" extrusionOk="0">
+                      <a:moveTo>
+                        <a:pt x="-1" y="0"/>
+                      </a:moveTo>
+                      <a:cubicBezTo>
+                        <a:pt x="8541" y="0"/>
+                        <a:pt x="16280" y="5033"/>
+                        <a:pt x="19744" y="12840"/>
+                      </a:cubicBezTo>
+                    </a:path>
+                    <a:path w="19744" h="21600" stroke="0" extrusionOk="0">
+                      <a:moveTo>
+                        <a:pt x="-1" y="0"/>
+                      </a:moveTo>
+                      <a:cubicBezTo>
+                        <a:pt x="8541" y="0"/>
+                        <a:pt x="16280" y="5033"/>
+                        <a:pt x="19744" y="12840"/>
+                      </a:cubicBezTo>
+                      <a:lnTo>
+                        <a:pt x="0" y="21600"/>
+                      </a:lnTo>
+                      <a:close/>
+                    </a:path>
+                  </a:pathLst>
+                </a:custGeom>
+                <a:solidFill>
+                  <a:schemeClr val="tx1"/>
+                </a:solidFill>
+                <a:ln w="53975">
+                  <a:gradFill>
+                    <a:gsLst>
+                      <a:gs pos="0">
+                        <a:schemeClr val="accent5">
+                          <a:lumMod val="20000"/>
+                          <a:lumOff val="80000"/>
+                        </a:schemeClr>
+                      </a:gs>
+                      <a:gs pos="41000">
+                        <a:schemeClr val="accent1">
+                          <a:lumMod val="45000"/>
+                          <a:lumOff val="55000"/>
+                        </a:schemeClr>
+                      </a:gs>
+                      <a:gs pos="76000">
+                        <a:schemeClr val="accent1">
+                          <a:lumMod val="30000"/>
+                          <a:lumOff val="70000"/>
+                        </a:schemeClr>
+                      </a:gs>
+                    </a:gsLst>
+                    <a:lin ang="5400000" scaled="1"/>
+                  </a:gradFill>
+                  <a:round/>
+                  <a:headEnd/>
+                  <a:tailEnd/>
+                </a:ln>
+              </p:spPr>
+              <p:txBody>
+                <a:bodyPr wrap="none" anchor="ctr"/>
+                <a:lstStyle/>
+                <a:p>
+                  <a:endParaRPr lang="id-ID" dirty="0"/>
+                </a:p>
+              </p:txBody>
+            </p:sp>
+          </p:grpSp>
+          <p:grpSp>
+            <p:nvGrpSpPr>
+              <p:cNvPr id="12" name="Group 11">
+                <a:extLst>
+                  <a:ext uri="{FF2B5EF4-FFF2-40B4-BE49-F238E27FC236}">
+                    <a16:creationId xmlns:a16="http://schemas.microsoft.com/office/drawing/2014/main" id="{DB8B1D7D-22FC-2E24-11BA-DC5BD8AB29FF}"/>
+                  </a:ext>
+                </a:extLst>
+              </p:cNvPr>
+              <p:cNvGrpSpPr/>
+              <p:nvPr/>
+            </p:nvGrpSpPr>
+            <p:grpSpPr>
+              <a:xfrm>
+                <a:off x="1657431" y="1755227"/>
+                <a:ext cx="6664512" cy="3358546"/>
+                <a:chOff x="704056" y="16217"/>
+                <a:chExt cx="6664512" cy="3358546"/>
+              </a:xfrm>
+            </p:grpSpPr>
+            <p:grpSp>
+              <p:nvGrpSpPr>
+                <p:cNvPr id="13" name="Group 5">
+                  <a:extLst>
+                    <a:ext uri="{FF2B5EF4-FFF2-40B4-BE49-F238E27FC236}">
+                      <a16:creationId xmlns:a16="http://schemas.microsoft.com/office/drawing/2014/main" id="{70E153C3-44F8-CF05-504E-F8F22A13BA74}"/>
+                    </a:ext>
+                  </a:extLst>
+                </p:cNvPr>
+                <p:cNvGrpSpPr>
+                  <a:grpSpLocks/>
+                </p:cNvGrpSpPr>
+                <p:nvPr/>
+              </p:nvGrpSpPr>
+              <p:grpSpPr bwMode="auto">
+                <a:xfrm>
+                  <a:off x="704056" y="256912"/>
+                  <a:ext cx="5022851" cy="3117851"/>
+                  <a:chOff x="1837" y="2069"/>
+                  <a:chExt cx="3164" cy="1964"/>
+                </a:xfrm>
+              </p:grpSpPr>
+              <p:sp>
+                <p:nvSpPr>
+                  <p:cNvPr id="16" name="Oval 6" descr="Dark upward diagonal">
+                    <a:extLst>
+                      <a:ext uri="{FF2B5EF4-FFF2-40B4-BE49-F238E27FC236}">
+                        <a16:creationId xmlns:a16="http://schemas.microsoft.com/office/drawing/2014/main" id="{4F2F06F0-33C6-EDCB-B115-A840A6F3B56F}"/>
+                      </a:ext>
+                    </a:extLst>
+                  </p:cNvPr>
+                  <p:cNvSpPr>
+                    <a:spLocks noChangeArrowheads="1"/>
+                  </p:cNvSpPr>
+                  <p:nvPr/>
+                </p:nvSpPr>
+                <p:spPr bwMode="auto">
+                  <a:xfrm>
+                    <a:off x="1837" y="2069"/>
+                    <a:ext cx="2041" cy="1951"/>
+                  </a:xfrm>
+                  <a:prstGeom prst="ellipse">
+                    <a:avLst/>
+                  </a:prstGeom>
+                  <a:pattFill prst="dkUpDiag">
+                    <a:fgClr>
+                      <a:schemeClr val="accent1"/>
+                    </a:fgClr>
+                    <a:bgClr>
+                      <a:schemeClr val="bg1"/>
+                    </a:bgClr>
+                  </a:pattFill>
+                  <a:ln w="9525">
+                    <a:solidFill>
+                      <a:srgbClr val="885677"/>
+                    </a:solidFill>
+                    <a:round/>
+                    <a:headEnd/>
+                    <a:tailEnd/>
+                  </a:ln>
+                </p:spPr>
+                <p:txBody>
+                  <a:bodyPr wrap="none" anchor="ctr"/>
+                  <a:lstStyle/>
+                  <a:p>
+                    <a:endParaRPr lang="id-ID" dirty="0"/>
+                  </a:p>
+                </p:txBody>
+              </p:sp>
+              <p:sp>
+                <p:nvSpPr>
+                  <p:cNvPr id="17" name="Oval 7">
+                    <a:extLst>
+                      <a:ext uri="{FF2B5EF4-FFF2-40B4-BE49-F238E27FC236}">
+                        <a16:creationId xmlns:a16="http://schemas.microsoft.com/office/drawing/2014/main" id="{107DBBFD-60A8-3EA2-A0EE-581076AF769C}"/>
+                      </a:ext>
+                    </a:extLst>
+                  </p:cNvPr>
+                  <p:cNvSpPr>
+                    <a:spLocks noChangeArrowheads="1"/>
+                  </p:cNvSpPr>
+                  <p:nvPr/>
+                </p:nvSpPr>
+                <p:spPr bwMode="auto">
+                  <a:xfrm>
+                    <a:off x="1927" y="2160"/>
+                    <a:ext cx="1860" cy="1770"/>
+                  </a:xfrm>
+                  <a:prstGeom prst="ellipse">
+                    <a:avLst/>
+                  </a:prstGeom>
+                  <a:solidFill>
+                    <a:schemeClr val="bg1"/>
+                  </a:solidFill>
+                  <a:ln w="9525">
+                    <a:noFill/>
+                    <a:round/>
+                    <a:headEnd/>
+                    <a:tailEnd/>
+                  </a:ln>
+                </p:spPr>
+                <p:txBody>
+                  <a:bodyPr wrap="none" anchor="ctr"/>
+                  <a:lstStyle/>
+                  <a:p>
+                    <a:endParaRPr lang="id-ID"/>
+                  </a:p>
+                </p:txBody>
+              </p:sp>
+              <p:sp>
+                <p:nvSpPr>
+                  <p:cNvPr id="18" name="Oval 8">
+                    <a:extLst>
+                      <a:ext uri="{FF2B5EF4-FFF2-40B4-BE49-F238E27FC236}">
+                        <a16:creationId xmlns:a16="http://schemas.microsoft.com/office/drawing/2014/main" id="{C5E5364A-1B68-447F-2877-F6B113E07AE8}"/>
+                      </a:ext>
+                    </a:extLst>
+                  </p:cNvPr>
+                  <p:cNvSpPr>
+                    <a:spLocks noChangeArrowheads="1"/>
+                  </p:cNvSpPr>
+                  <p:nvPr/>
+                </p:nvSpPr>
+                <p:spPr bwMode="auto">
+                  <a:xfrm>
+                    <a:off x="3515" y="2704"/>
+                    <a:ext cx="499" cy="499"/>
+                  </a:xfrm>
+                  <a:prstGeom prst="ellipse">
+                    <a:avLst/>
+                  </a:prstGeom>
+                  <a:solidFill>
+                    <a:srgbClr val="BCE8F2">
+                      <a:alpha val="50980"/>
+                    </a:srgbClr>
+                  </a:solidFill>
+                  <a:ln w="57150" cmpd="thinThick">
+                    <a:solidFill>
+                      <a:srgbClr val="0070C0"/>
+                    </a:solidFill>
+                    <a:round/>
+                    <a:headEnd/>
+                    <a:tailEnd/>
+                  </a:ln>
+                </p:spPr>
+                <p:txBody>
+                  <a:bodyPr wrap="none" anchor="ctr"/>
+                  <a:lstStyle/>
+                  <a:p>
+                    <a:endParaRPr lang="id-ID"/>
+                  </a:p>
+                </p:txBody>
+              </p:sp>
+              <p:grpSp>
+                <p:nvGrpSpPr>
+                  <p:cNvPr id="19" name="Group 9">
+                    <a:extLst>
+                      <a:ext uri="{FF2B5EF4-FFF2-40B4-BE49-F238E27FC236}">
+                        <a16:creationId xmlns:a16="http://schemas.microsoft.com/office/drawing/2014/main" id="{AD4EB55F-03CB-F624-02A0-B34D6494BE43}"/>
+                      </a:ext>
+                    </a:extLst>
+                  </p:cNvPr>
+                  <p:cNvGrpSpPr>
+                    <a:grpSpLocks/>
+                  </p:cNvGrpSpPr>
+                  <p:nvPr/>
+                </p:nvGrpSpPr>
+                <p:grpSpPr bwMode="auto">
+                  <a:xfrm>
+                    <a:off x="4571" y="3443"/>
+                    <a:ext cx="430" cy="590"/>
+                    <a:chOff x="4923" y="3126"/>
+                    <a:chExt cx="430" cy="590"/>
+                  </a:xfrm>
+                </p:grpSpPr>
+                <p:sp>
+                  <p:nvSpPr>
+                    <p:cNvPr id="20" name="Arc 10" descr="Dark downward diagonal">
+                      <a:extLst>
+                        <a:ext uri="{FF2B5EF4-FFF2-40B4-BE49-F238E27FC236}">
+                          <a16:creationId xmlns:a16="http://schemas.microsoft.com/office/drawing/2014/main" id="{74AA8B51-7DA9-E205-C733-52DC43915386}"/>
+                        </a:ext>
+                      </a:extLst>
+                    </p:cNvPr>
+                    <p:cNvSpPr>
+                      <a:spLocks/>
+                    </p:cNvSpPr>
+                    <p:nvPr/>
+                  </p:nvSpPr>
+                  <p:spPr bwMode="auto">
+                    <a:xfrm rot="2345067">
+                      <a:off x="4979" y="3126"/>
+                      <a:ext cx="374" cy="590"/>
+                    </a:xfrm>
+                    <a:custGeom>
+                      <a:avLst/>
+                      <a:gdLst>
+                        <a:gd name="T0" fmla="*/ 0 w 19744"/>
+                        <a:gd name="T1" fmla="*/ 0 h 21600"/>
+                        <a:gd name="T2" fmla="*/ 7 w 19744"/>
+                        <a:gd name="T3" fmla="*/ 10 h 21600"/>
+                        <a:gd name="T4" fmla="*/ 0 w 19744"/>
+                        <a:gd name="T5" fmla="*/ 16 h 21600"/>
+                        <a:gd name="T6" fmla="*/ 0 60000 65536"/>
+                        <a:gd name="T7" fmla="*/ 0 60000 65536"/>
+                        <a:gd name="T8" fmla="*/ 0 60000 65536"/>
+                        <a:gd name="T9" fmla="*/ 0 w 19744"/>
+                        <a:gd name="T10" fmla="*/ 0 h 21600"/>
+                        <a:gd name="T11" fmla="*/ 19744 w 19744"/>
+                        <a:gd name="T12" fmla="*/ 21600 h 21600"/>
+                      </a:gdLst>
+                      <a:ahLst/>
+                      <a:cxnLst>
+                        <a:cxn ang="T6">
+                          <a:pos x="T0" y="T1"/>
+                        </a:cxn>
+                        <a:cxn ang="T7">
+                          <a:pos x="T2" y="T3"/>
+                        </a:cxn>
+                        <a:cxn ang="T8">
+                          <a:pos x="T4" y="T5"/>
+                        </a:cxn>
+                      </a:cxnLst>
+                      <a:rect l="T9" t="T10" r="T11" b="T12"/>
+                      <a:pathLst>
+                        <a:path w="19744" h="21600" fill="none" extrusionOk="0">
+                          <a:moveTo>
+                            <a:pt x="-1" y="0"/>
+                          </a:moveTo>
+                          <a:cubicBezTo>
+                            <a:pt x="8541" y="0"/>
+                            <a:pt x="16280" y="5033"/>
+                            <a:pt x="19744" y="12840"/>
+                          </a:cubicBezTo>
+                        </a:path>
+                        <a:path w="19744" h="21600" stroke="0" extrusionOk="0">
+                          <a:moveTo>
+                            <a:pt x="-1" y="0"/>
+                          </a:moveTo>
+                          <a:cubicBezTo>
+                            <a:pt x="8541" y="0"/>
+                            <a:pt x="16280" y="5033"/>
+                            <a:pt x="19744" y="12840"/>
+                          </a:cubicBezTo>
+                          <a:lnTo>
+                            <a:pt x="0" y="21600"/>
+                          </a:lnTo>
+                          <a:close/>
+                        </a:path>
+                      </a:pathLst>
+                    </a:custGeom>
+                    <a:pattFill prst="dkUpDiag">
+                      <a:fgClr>
+                        <a:srgbClr val="0070C0"/>
+                      </a:fgClr>
+                      <a:bgClr>
+                        <a:schemeClr val="bg1"/>
+                      </a:bgClr>
+                    </a:pattFill>
+                    <a:ln w="44450">
+                      <a:gradFill>
+                        <a:gsLst>
+                          <a:gs pos="15000">
+                            <a:schemeClr val="accent5">
+                              <a:lumMod val="20000"/>
+                              <a:lumOff val="80000"/>
+                            </a:schemeClr>
+                          </a:gs>
+                          <a:gs pos="45000">
+                            <a:schemeClr val="accent1">
+                              <a:lumMod val="45000"/>
+                              <a:lumOff val="55000"/>
+                            </a:schemeClr>
+                          </a:gs>
+                          <a:gs pos="68000">
+                            <a:schemeClr val="accent1">
+                              <a:lumMod val="30000"/>
+                              <a:lumOff val="70000"/>
+                            </a:schemeClr>
+                          </a:gs>
+                        </a:gsLst>
+                        <a:lin ang="5400000" scaled="1"/>
+                      </a:gradFill>
+                      <a:round/>
+                      <a:headEnd/>
+                      <a:tailEnd/>
+                    </a:ln>
+                  </p:spPr>
+                  <p:txBody>
+                    <a:bodyPr wrap="none" anchor="ctr"/>
+                    <a:lstStyle/>
+                    <a:p>
+                      <a:endParaRPr lang="id-ID" dirty="0"/>
+                    </a:p>
+                  </p:txBody>
+                </p:sp>
+                <p:sp>
+                  <p:nvSpPr>
+                    <p:cNvPr id="21" name="Arc 11">
+                      <a:extLst>
+                        <a:ext uri="{FF2B5EF4-FFF2-40B4-BE49-F238E27FC236}">
+                          <a16:creationId xmlns:a16="http://schemas.microsoft.com/office/drawing/2014/main" id="{5E1176D9-18A8-9874-112A-2423B25A43A6}"/>
+                        </a:ext>
+                      </a:extLst>
+                    </p:cNvPr>
+                    <p:cNvSpPr>
+                      <a:spLocks/>
+                    </p:cNvSpPr>
+                    <p:nvPr/>
+                  </p:nvSpPr>
+                  <p:spPr bwMode="auto">
+                    <a:xfrm rot="2345067">
+                      <a:off x="4923" y="3126"/>
+                      <a:ext cx="374" cy="590"/>
+                    </a:xfrm>
+                    <a:custGeom>
+                      <a:avLst/>
+                      <a:gdLst>
+                        <a:gd name="T0" fmla="*/ 0 w 19744"/>
+                        <a:gd name="T1" fmla="*/ 0 h 21600"/>
+                        <a:gd name="T2" fmla="*/ 7 w 19744"/>
+                        <a:gd name="T3" fmla="*/ 10 h 21600"/>
+                        <a:gd name="T4" fmla="*/ 0 w 19744"/>
+                        <a:gd name="T5" fmla="*/ 16 h 21600"/>
+                        <a:gd name="T6" fmla="*/ 0 60000 65536"/>
+                        <a:gd name="T7" fmla="*/ 0 60000 65536"/>
+                        <a:gd name="T8" fmla="*/ 0 60000 65536"/>
+                        <a:gd name="T9" fmla="*/ 0 w 19744"/>
+                        <a:gd name="T10" fmla="*/ 0 h 21600"/>
+                        <a:gd name="T11" fmla="*/ 19744 w 19744"/>
+                        <a:gd name="T12" fmla="*/ 21600 h 21600"/>
+                      </a:gdLst>
+                      <a:ahLst/>
+                      <a:cxnLst>
+                        <a:cxn ang="T6">
+                          <a:pos x="T0" y="T1"/>
+                        </a:cxn>
+                        <a:cxn ang="T7">
+                          <a:pos x="T2" y="T3"/>
+                        </a:cxn>
+                        <a:cxn ang="T8">
+                          <a:pos x="T4" y="T5"/>
+                        </a:cxn>
+                      </a:cxnLst>
+                      <a:rect l="T9" t="T10" r="T11" b="T12"/>
+                      <a:pathLst>
+                        <a:path w="19744" h="21600" fill="none" extrusionOk="0">
+                          <a:moveTo>
+                            <a:pt x="-1" y="0"/>
+                          </a:moveTo>
+                          <a:cubicBezTo>
+                            <a:pt x="8541" y="0"/>
+                            <a:pt x="16280" y="5033"/>
+                            <a:pt x="19744" y="12840"/>
+                          </a:cubicBezTo>
+                        </a:path>
+                        <a:path w="19744" h="21600" stroke="0" extrusionOk="0">
+                          <a:moveTo>
+                            <a:pt x="-1" y="0"/>
+                          </a:moveTo>
+                          <a:cubicBezTo>
+                            <a:pt x="8541" y="0"/>
+                            <a:pt x="16280" y="5033"/>
+                            <a:pt x="19744" y="12840"/>
+                          </a:cubicBezTo>
+                          <a:lnTo>
+                            <a:pt x="0" y="21600"/>
+                          </a:lnTo>
+                          <a:close/>
+                        </a:path>
+                      </a:pathLst>
+                    </a:custGeom>
+                    <a:solidFill>
+                      <a:schemeClr val="tx1"/>
+                    </a:solidFill>
+                    <a:ln w="9525">
+                      <a:noFill/>
+                      <a:round/>
+                      <a:headEnd/>
+                      <a:tailEnd/>
+                    </a:ln>
+                  </p:spPr>
+                  <p:txBody>
+                    <a:bodyPr wrap="none" anchor="ctr"/>
+                    <a:lstStyle/>
+                    <a:p>
+                      <a:endParaRPr lang="id-ID" dirty="0"/>
+                    </a:p>
+                  </p:txBody>
+                </p:sp>
+              </p:grpSp>
+            </p:grpSp>
+            <p:sp>
+              <p:nvSpPr>
+                <p:cNvPr id="14" name="Line 21">
+                  <a:extLst>
+                    <a:ext uri="{FF2B5EF4-FFF2-40B4-BE49-F238E27FC236}">
+                      <a16:creationId xmlns:a16="http://schemas.microsoft.com/office/drawing/2014/main" id="{29DE157B-0534-CB93-9244-2F73572BBE9E}"/>
+                    </a:ext>
+                  </a:extLst>
+                </p:cNvPr>
+                <p:cNvSpPr>
+                  <a:spLocks noChangeShapeType="1"/>
+                </p:cNvSpPr>
+                <p:nvPr/>
+              </p:nvSpPr>
+              <p:spPr bwMode="auto">
+                <a:xfrm>
+                  <a:off x="3836332" y="1676136"/>
+                  <a:ext cx="1521766" cy="1163203"/>
+                </a:xfrm>
+                <a:prstGeom prst="line">
+                  <a:avLst/>
+                </a:prstGeom>
+                <a:noFill/>
+                <a:ln w="38100">
+                  <a:solidFill>
+                    <a:srgbClr val="FF3300"/>
+                  </a:solidFill>
+                  <a:round/>
+                  <a:headEnd/>
+                  <a:tailEnd type="triangle" w="med" len="med"/>
+                </a:ln>
+              </p:spPr>
+              <p:txBody>
+                <a:bodyPr/>
+                <a:lstStyle/>
+                <a:p>
+                  <a:endParaRPr lang="id-ID"/>
+                </a:p>
+              </p:txBody>
+            </p:sp>
+            <p:sp>
+              <p:nvSpPr>
+                <p:cNvPr id="15" name="Text Box 24">
+                  <a:extLst>
+                    <a:ext uri="{FF2B5EF4-FFF2-40B4-BE49-F238E27FC236}">
+                      <a16:creationId xmlns:a16="http://schemas.microsoft.com/office/drawing/2014/main" id="{84FBC1C8-CE48-97A7-ABEB-35B152DFF738}"/>
+                    </a:ext>
+                  </a:extLst>
+                </p:cNvPr>
+                <p:cNvSpPr txBox="1">
+                  <a:spLocks noChangeArrowheads="1"/>
+                </p:cNvSpPr>
+                <p:nvPr/>
+              </p:nvSpPr>
+              <p:spPr bwMode="auto">
+                <a:xfrm>
+                  <a:off x="5955730" y="2607982"/>
+                  <a:ext cx="1368425" cy="366712"/>
+                </a:xfrm>
+                <a:prstGeom prst="rect">
+                  <a:avLst/>
+                </a:prstGeom>
+                <a:solidFill>
+                  <a:srgbClr val="C6D8D2"/>
+                </a:solidFill>
+                <a:ln w="9525">
+                  <a:noFill/>
+                  <a:miter lim="800000"/>
+                  <a:headEnd/>
+                  <a:tailEnd/>
+                </a:ln>
+              </p:spPr>
+              <p:txBody>
+                <a:bodyPr>
+                  <a:spAutoFit/>
+                </a:bodyPr>
+                <a:lstStyle/>
+                <a:p>
+                  <a:pPr algn="ctr">
+                    <a:spcBef>
+                      <a:spcPct val="50000"/>
+                    </a:spcBef>
+                  </a:pPr>
+                  <a:r>
+                    <a:rPr lang="en-US" b="1" dirty="0" err="1">
+                      <a:latin typeface="Times New Roman" panose="02020603050405020304" pitchFamily="18" charset="0"/>
+                      <a:cs typeface="Times New Roman" panose="02020603050405020304" pitchFamily="18" charset="0"/>
+                    </a:rPr>
+                    <a:t>Cembung</a:t>
+                  </a:r>
+                  <a:r>
+                    <a:rPr lang="en-US" b="1" dirty="0">
+                      <a:latin typeface="Times New Roman" panose="02020603050405020304" pitchFamily="18" charset="0"/>
+                      <a:cs typeface="Times New Roman" panose="02020603050405020304" pitchFamily="18" charset="0"/>
+                    </a:rPr>
+                    <a:t> </a:t>
+                  </a:r>
+                </a:p>
+              </p:txBody>
+            </p:sp>
+            <p:sp>
+              <p:nvSpPr>
+                <p:cNvPr id="24" name="Line 21">
+                  <a:extLst>
+                    <a:ext uri="{FF2B5EF4-FFF2-40B4-BE49-F238E27FC236}">
+                      <a16:creationId xmlns:a16="http://schemas.microsoft.com/office/drawing/2014/main" id="{70716E79-8F5C-37C5-241E-D238EABA10F9}"/>
+                    </a:ext>
+                  </a:extLst>
+                </p:cNvPr>
+                <p:cNvSpPr>
+                  <a:spLocks noChangeShapeType="1"/>
+                </p:cNvSpPr>
+                <p:nvPr/>
+              </p:nvSpPr>
+              <p:spPr bwMode="auto">
+                <a:xfrm flipV="1">
+                  <a:off x="3836332" y="588638"/>
+                  <a:ext cx="1617443" cy="1087500"/>
+                </a:xfrm>
+                <a:prstGeom prst="line">
+                  <a:avLst/>
+                </a:prstGeom>
+                <a:noFill/>
+                <a:ln w="38100">
+                  <a:solidFill>
+                    <a:srgbClr val="FF3300"/>
+                  </a:solidFill>
+                  <a:round/>
+                  <a:headEnd/>
+                  <a:tailEnd type="triangle" w="med" len="med"/>
+                </a:ln>
+              </p:spPr>
+              <p:txBody>
+                <a:bodyPr/>
+                <a:lstStyle/>
+                <a:p>
+                  <a:endParaRPr lang="id-ID" dirty="0"/>
+                </a:p>
+              </p:txBody>
+            </p:sp>
+            <p:sp>
+              <p:nvSpPr>
+                <p:cNvPr id="25" name="Text Box 24">
+                  <a:extLst>
+                    <a:ext uri="{FF2B5EF4-FFF2-40B4-BE49-F238E27FC236}">
+                      <a16:creationId xmlns:a16="http://schemas.microsoft.com/office/drawing/2014/main" id="{9EC83C38-A390-6F0F-1AAD-727F497190FC}"/>
+                    </a:ext>
+                  </a:extLst>
+                </p:cNvPr>
+                <p:cNvSpPr txBox="1">
+                  <a:spLocks noChangeArrowheads="1"/>
+                </p:cNvSpPr>
+                <p:nvPr/>
+              </p:nvSpPr>
+              <p:spPr bwMode="auto">
+                <a:xfrm>
+                  <a:off x="6000143" y="347941"/>
+                  <a:ext cx="1368425" cy="366712"/>
+                </a:xfrm>
+                <a:prstGeom prst="rect">
+                  <a:avLst/>
+                </a:prstGeom>
+                <a:solidFill>
+                  <a:srgbClr val="C6D8D2"/>
+                </a:solidFill>
+                <a:ln w="9525">
+                  <a:noFill/>
+                  <a:miter lim="800000"/>
+                  <a:headEnd/>
+                  <a:tailEnd/>
+                </a:ln>
+              </p:spPr>
+              <p:txBody>
+                <a:bodyPr>
+                  <a:spAutoFit/>
+                </a:bodyPr>
+                <a:lstStyle/>
+                <a:p>
+                  <a:pPr algn="ctr">
+                    <a:spcBef>
+                      <a:spcPct val="50000"/>
+                    </a:spcBef>
+                  </a:pPr>
+                  <a:r>
+                    <a:rPr lang="en-US" b="1" dirty="0" err="1">
+                      <a:latin typeface="Times New Roman" panose="02020603050405020304" pitchFamily="18" charset="0"/>
+                      <a:cs typeface="Times New Roman" panose="02020603050405020304" pitchFamily="18" charset="0"/>
+                    </a:rPr>
+                    <a:t>Cekung</a:t>
+                  </a:r>
+                  <a:r>
+                    <a:rPr lang="en-US" b="1" dirty="0"/>
+                    <a:t> </a:t>
+                  </a:r>
+                </a:p>
+              </p:txBody>
+            </p:sp>
+            <p:sp>
+              <p:nvSpPr>
+                <p:cNvPr id="28" name="Line 21">
+                  <a:extLst>
+                    <a:ext uri="{FF2B5EF4-FFF2-40B4-BE49-F238E27FC236}">
+                      <a16:creationId xmlns:a16="http://schemas.microsoft.com/office/drawing/2014/main" id="{EA80A2FB-B061-0092-C285-E9297176A9EE}"/>
+                    </a:ext>
+                  </a:extLst>
+                </p:cNvPr>
+                <p:cNvSpPr>
+                  <a:spLocks noChangeShapeType="1"/>
+                </p:cNvSpPr>
+                <p:nvPr/>
+              </p:nvSpPr>
+              <p:spPr bwMode="auto">
+                <a:xfrm>
+                  <a:off x="4815459" y="16217"/>
+                  <a:ext cx="542639" cy="148797"/>
+                </a:xfrm>
+                <a:prstGeom prst="line">
+                  <a:avLst/>
+                </a:prstGeom>
+                <a:noFill/>
+                <a:ln w="38100">
+                  <a:solidFill>
+                    <a:schemeClr val="bg1"/>
+                  </a:solidFill>
+                  <a:round/>
+                  <a:headEnd/>
+                  <a:tailEnd type="triangle" w="med" len="med"/>
+                </a:ln>
+              </p:spPr>
+              <p:txBody>
+                <a:bodyPr/>
+                <a:lstStyle/>
+                <a:p>
+                  <a:endParaRPr lang="id-ID" dirty="0"/>
+                </a:p>
+              </p:txBody>
+            </p:sp>
+            <p:sp>
+              <p:nvSpPr>
+                <p:cNvPr id="31" name="Line 21">
+                  <a:extLst>
+                    <a:ext uri="{FF2B5EF4-FFF2-40B4-BE49-F238E27FC236}">
+                      <a16:creationId xmlns:a16="http://schemas.microsoft.com/office/drawing/2014/main" id="{7F592265-6F65-3A6E-0D8F-0E331D61AC9F}"/>
+                    </a:ext>
+                  </a:extLst>
+                </p:cNvPr>
+                <p:cNvSpPr>
+                  <a:spLocks noChangeShapeType="1"/>
+                </p:cNvSpPr>
+                <p:nvPr/>
+              </p:nvSpPr>
+              <p:spPr bwMode="auto">
+                <a:xfrm flipH="1">
+                  <a:off x="5684410" y="2206979"/>
+                  <a:ext cx="542639" cy="148797"/>
+                </a:xfrm>
+                <a:prstGeom prst="line">
+                  <a:avLst/>
+                </a:prstGeom>
+                <a:noFill/>
+                <a:ln w="38100">
+                  <a:solidFill>
+                    <a:schemeClr val="bg1"/>
+                  </a:solidFill>
+                  <a:round/>
+                  <a:headEnd/>
+                  <a:tailEnd type="triangle" w="med" len="med"/>
+                </a:ln>
+              </p:spPr>
+              <p:txBody>
+                <a:bodyPr/>
+                <a:lstStyle/>
+                <a:p>
+                  <a:endParaRPr lang="id-ID" dirty="0"/>
+                </a:p>
+              </p:txBody>
+            </p:sp>
+            <p:sp>
+              <p:nvSpPr>
+                <p:cNvPr id="34" name="Line 21">
+                  <a:extLst>
+                    <a:ext uri="{FF2B5EF4-FFF2-40B4-BE49-F238E27FC236}">
+                      <a16:creationId xmlns:a16="http://schemas.microsoft.com/office/drawing/2014/main" id="{EE67DA9B-1E54-1501-B902-8F9BA1B81585}"/>
+                    </a:ext>
+                  </a:extLst>
+                </p:cNvPr>
+                <p:cNvSpPr>
+                  <a:spLocks noChangeShapeType="1"/>
+                </p:cNvSpPr>
+                <p:nvPr/>
+              </p:nvSpPr>
+              <p:spPr bwMode="auto">
+                <a:xfrm>
+                  <a:off x="3110949" y="1208393"/>
+                  <a:ext cx="542639" cy="148797"/>
+                </a:xfrm>
+                <a:prstGeom prst="line">
+                  <a:avLst/>
+                </a:prstGeom>
+                <a:noFill/>
+                <a:ln w="38100">
+                  <a:solidFill>
+                    <a:schemeClr val="tx1"/>
+                  </a:solidFill>
+                  <a:round/>
+                  <a:headEnd/>
+                  <a:tailEnd type="triangle" w="med" len="med"/>
+                </a:ln>
+              </p:spPr>
+              <p:txBody>
+                <a:bodyPr/>
+                <a:lstStyle/>
+                <a:p>
+                  <a:endParaRPr lang="id-ID" dirty="0"/>
+                </a:p>
+              </p:txBody>
+            </p:sp>
+          </p:grpSp>
+        </p:grpSp>
+        <p:sp>
+          <p:nvSpPr>
+            <p:cNvPr id="27" name="TextBox 26">
+              <a:extLst>
+                <a:ext uri="{FF2B5EF4-FFF2-40B4-BE49-F238E27FC236}">
+                  <a16:creationId xmlns:a16="http://schemas.microsoft.com/office/drawing/2014/main" id="{3606BF32-76E1-0F97-B34F-5331DA172350}"/>
+                </a:ext>
+              </a:extLst>
+            </p:cNvPr>
+            <p:cNvSpPr txBox="1"/>
+            <p:nvPr/>
+          </p:nvSpPr>
+          <p:spPr>
+            <a:xfrm>
+              <a:off x="3675033" y="1213711"/>
+              <a:ext cx="2156048" cy="646331"/>
+            </a:xfrm>
+            <a:prstGeom prst="rect">
+              <a:avLst/>
+            </a:prstGeom>
+            <a:noFill/>
+          </p:spPr>
+          <p:txBody>
+            <a:bodyPr wrap="square" rtlCol="0">
+              <a:spAutoFit/>
+            </a:bodyPr>
+            <a:lstStyle/>
+            <a:p>
+              <a:pPr algn="ctr"/>
+              <a:r>
+                <a:rPr lang="en-US" dirty="0">
+                  <a:solidFill>
+                    <a:schemeClr val="bg1"/>
+                  </a:solidFill>
+                  <a:latin typeface="Times New Roman" panose="02020603050405020304" pitchFamily="18" charset="0"/>
+                  <a:cs typeface="Times New Roman" panose="02020603050405020304" pitchFamily="18" charset="0"/>
+                </a:rPr>
+                <a:t>Bagian yang </a:t>
+              </a:r>
+              <a:r>
+                <a:rPr lang="en-US" dirty="0" err="1">
+                  <a:solidFill>
+                    <a:schemeClr val="bg1"/>
+                  </a:solidFill>
+                  <a:latin typeface="Times New Roman" panose="02020603050405020304" pitchFamily="18" charset="0"/>
+                  <a:cs typeface="Times New Roman" panose="02020603050405020304" pitchFamily="18" charset="0"/>
+                </a:rPr>
+                <a:t>dikilapkan</a:t>
+              </a:r>
+              <a:r>
+                <a:rPr lang="en-US" dirty="0">
+                  <a:solidFill>
+                    <a:schemeClr val="bg1"/>
+                  </a:solidFill>
+                  <a:latin typeface="Times New Roman" panose="02020603050405020304" pitchFamily="18" charset="0"/>
+                  <a:cs typeface="Times New Roman" panose="02020603050405020304" pitchFamily="18" charset="0"/>
+                </a:rPr>
+                <a:t> (dipoles)</a:t>
+              </a:r>
+              <a:endParaRPr lang="en-ID" dirty="0">
+                <a:solidFill>
+                  <a:schemeClr val="bg1"/>
+                </a:solidFill>
+                <a:latin typeface="Times New Roman" panose="02020603050405020304" pitchFamily="18" charset="0"/>
+                <a:cs typeface="Times New Roman" panose="02020603050405020304" pitchFamily="18" charset="0"/>
+              </a:endParaRPr>
+            </a:p>
+          </p:txBody>
+        </p:sp>
+        <p:sp>
+          <p:nvSpPr>
+            <p:cNvPr id="30" name="TextBox 29">
+              <a:extLst>
+                <a:ext uri="{FF2B5EF4-FFF2-40B4-BE49-F238E27FC236}">
+                  <a16:creationId xmlns:a16="http://schemas.microsoft.com/office/drawing/2014/main" id="{B5051DBC-839B-DE7D-D69A-C96486554148}"/>
+                </a:ext>
+              </a:extLst>
+            </p:cNvPr>
+            <p:cNvSpPr txBox="1"/>
+            <p:nvPr/>
+          </p:nvSpPr>
+          <p:spPr>
+            <a:xfrm>
+              <a:off x="7032551" y="3249270"/>
+              <a:ext cx="2156048" cy="646331"/>
+            </a:xfrm>
+            <a:prstGeom prst="rect">
+              <a:avLst/>
+            </a:prstGeom>
+            <a:noFill/>
+          </p:spPr>
+          <p:txBody>
+            <a:bodyPr wrap="square" rtlCol="0">
+              <a:spAutoFit/>
+            </a:bodyPr>
+            <a:lstStyle/>
+            <a:p>
+              <a:pPr algn="ctr"/>
+              <a:r>
+                <a:rPr lang="en-US" dirty="0">
+                  <a:solidFill>
+                    <a:schemeClr val="bg1"/>
+                  </a:solidFill>
+                  <a:latin typeface="Times New Roman" panose="02020603050405020304" pitchFamily="18" charset="0"/>
+                  <a:cs typeface="Times New Roman" panose="02020603050405020304" pitchFamily="18" charset="0"/>
+                </a:rPr>
+                <a:t>Bagian yang </a:t>
+              </a:r>
+              <a:r>
+                <a:rPr lang="en-US" dirty="0" err="1">
+                  <a:solidFill>
+                    <a:schemeClr val="bg1"/>
+                  </a:solidFill>
+                  <a:latin typeface="Times New Roman" panose="02020603050405020304" pitchFamily="18" charset="0"/>
+                  <a:cs typeface="Times New Roman" panose="02020603050405020304" pitchFamily="18" charset="0"/>
+                </a:rPr>
+                <a:t>dikilapkan</a:t>
+              </a:r>
+              <a:r>
+                <a:rPr lang="en-US" dirty="0">
+                  <a:solidFill>
+                    <a:schemeClr val="bg1"/>
+                  </a:solidFill>
+                  <a:latin typeface="Times New Roman" panose="02020603050405020304" pitchFamily="18" charset="0"/>
+                  <a:cs typeface="Times New Roman" panose="02020603050405020304" pitchFamily="18" charset="0"/>
+                </a:rPr>
+                <a:t> (dipoles)</a:t>
+              </a:r>
+              <a:endParaRPr lang="en-ID" dirty="0">
+                <a:solidFill>
+                  <a:schemeClr val="bg1"/>
+                </a:solidFill>
+                <a:latin typeface="Times New Roman" panose="02020603050405020304" pitchFamily="18" charset="0"/>
+                <a:cs typeface="Times New Roman" panose="02020603050405020304" pitchFamily="18" charset="0"/>
+              </a:endParaRPr>
+            </a:p>
+          </p:txBody>
+        </p:sp>
+        <p:sp>
+          <p:nvSpPr>
+            <p:cNvPr id="32" name="TextBox 31">
+              <a:extLst>
+                <a:ext uri="{FF2B5EF4-FFF2-40B4-BE49-F238E27FC236}">
+                  <a16:creationId xmlns:a16="http://schemas.microsoft.com/office/drawing/2014/main" id="{E0164232-FD58-BB68-0E81-A3CE8EA8738B}"/>
+                </a:ext>
+              </a:extLst>
+            </p:cNvPr>
+            <p:cNvSpPr txBox="1"/>
+            <p:nvPr/>
+          </p:nvSpPr>
+          <p:spPr>
+            <a:xfrm>
+              <a:off x="2439475" y="3303912"/>
+              <a:ext cx="1624849" cy="369332"/>
+            </a:xfrm>
+            <a:prstGeom prst="rect">
+              <a:avLst/>
+            </a:prstGeom>
+            <a:noFill/>
+          </p:spPr>
+          <p:txBody>
+            <a:bodyPr wrap="square" rtlCol="0">
+              <a:spAutoFit/>
+            </a:bodyPr>
+            <a:lstStyle/>
+            <a:p>
+              <a:pPr algn="ctr"/>
+              <a:r>
+                <a:rPr lang="en-US" dirty="0" err="1">
+                  <a:latin typeface="Times New Roman" panose="02020603050405020304" pitchFamily="18" charset="0"/>
+                  <a:cs typeface="Times New Roman" panose="02020603050405020304" pitchFamily="18" charset="0"/>
+                </a:rPr>
+                <a:t>Cermin</a:t>
+              </a:r>
+              <a:r>
+                <a:rPr lang="en-US" dirty="0">
+                  <a:latin typeface="Times New Roman" panose="02020603050405020304" pitchFamily="18" charset="0"/>
+                  <a:cs typeface="Times New Roman" panose="02020603050405020304" pitchFamily="18" charset="0"/>
+                </a:rPr>
+                <a:t> </a:t>
+              </a:r>
+              <a:r>
+                <a:rPr lang="en-US" dirty="0" err="1">
+                  <a:latin typeface="Times New Roman" panose="02020603050405020304" pitchFamily="18" charset="0"/>
+                  <a:cs typeface="Times New Roman" panose="02020603050405020304" pitchFamily="18" charset="0"/>
+                </a:rPr>
+                <a:t>Sferis</a:t>
+              </a:r>
+              <a:endParaRPr lang="en-ID" dirty="0">
+                <a:latin typeface="Times New Roman" panose="02020603050405020304" pitchFamily="18" charset="0"/>
+                <a:cs typeface="Times New Roman" panose="02020603050405020304" pitchFamily="18" charset="0"/>
+              </a:endParaRPr>
+            </a:p>
+          </p:txBody>
+        </p:sp>
+        <p:sp>
+          <p:nvSpPr>
+            <p:cNvPr id="33" name="TextBox 32">
+              <a:extLst>
+                <a:ext uri="{FF2B5EF4-FFF2-40B4-BE49-F238E27FC236}">
+                  <a16:creationId xmlns:a16="http://schemas.microsoft.com/office/drawing/2014/main" id="{8D6F3140-32DC-757F-8722-81D597B91CA5}"/>
+                </a:ext>
+              </a:extLst>
+            </p:cNvPr>
+            <p:cNvSpPr txBox="1"/>
+            <p:nvPr/>
+          </p:nvSpPr>
+          <p:spPr>
+            <a:xfrm>
+              <a:off x="3500777" y="2506705"/>
+              <a:ext cx="936116" cy="430887"/>
+            </a:xfrm>
+            <a:prstGeom prst="rect">
+              <a:avLst/>
+            </a:prstGeom>
+            <a:noFill/>
+          </p:spPr>
+          <p:txBody>
+            <a:bodyPr wrap="square" rtlCol="0">
+              <a:spAutoFit/>
+            </a:bodyPr>
+            <a:lstStyle/>
+            <a:p>
+              <a:pPr algn="ctr"/>
+              <a:r>
+                <a:rPr lang="en-US" sz="1050" dirty="0">
+                  <a:latin typeface="Times New Roman" panose="02020603050405020304" pitchFamily="18" charset="0"/>
+                  <a:cs typeface="Times New Roman" panose="02020603050405020304" pitchFamily="18" charset="0"/>
+                </a:rPr>
+                <a:t>Bagian </a:t>
+              </a:r>
+              <a:r>
+                <a:rPr lang="en-US" sz="1050" dirty="0" err="1">
+                  <a:latin typeface="Times New Roman" panose="02020603050405020304" pitchFamily="18" charset="0"/>
+                  <a:cs typeface="Times New Roman" panose="02020603050405020304" pitchFamily="18" charset="0"/>
+                </a:rPr>
+                <a:t>cermin</a:t>
+              </a:r>
+              <a:r>
+                <a:rPr lang="en-US" sz="1050" dirty="0">
+                  <a:latin typeface="Times New Roman" panose="02020603050405020304" pitchFamily="18" charset="0"/>
+                  <a:cs typeface="Times New Roman" panose="02020603050405020304" pitchFamily="18" charset="0"/>
+                </a:rPr>
+                <a:t> </a:t>
+              </a:r>
+              <a:r>
+                <a:rPr lang="en-US" sz="1050" dirty="0" err="1">
+                  <a:latin typeface="Times New Roman" panose="02020603050405020304" pitchFamily="18" charset="0"/>
+                  <a:cs typeface="Times New Roman" panose="02020603050405020304" pitchFamily="18" charset="0"/>
+                </a:rPr>
+                <a:t>sferis</a:t>
+              </a:r>
+              <a:endParaRPr lang="en-ID" sz="1050" dirty="0">
+                <a:latin typeface="Times New Roman" panose="02020603050405020304" pitchFamily="18" charset="0"/>
+                <a:cs typeface="Times New Roman" panose="02020603050405020304" pitchFamily="18" charset="0"/>
+              </a:endParaRPr>
+            </a:p>
+          </p:txBody>
+        </p:sp>
+      </p:grpSp>
+    </p:spTree>
+    <p:extLst>
+      <p:ext uri="{BB962C8B-B14F-4D97-AF65-F5344CB8AC3E}">
+        <p14:creationId xmlns:p14="http://schemas.microsoft.com/office/powerpoint/2010/main" val="3729762784"/>
+      </p:ext>
+    </p:extLst>
+  </p:cSld>
+  <p:clrMapOvr>
+    <a:masterClrMapping/>
+  </p:clrMapOvr>
+</p:sld>
+</file>
+
+<file path=ppt/slides/slide4.xml><?xml version="1.0" encoding="utf-8"?>
+<p:sld xmlns:a="http://schemas.openxmlformats.org/drawingml/2006/main" xmlns:r="http://schemas.openxmlformats.org/officeDocument/2006/relationships" xmlns:p="http://schemas.openxmlformats.org/presentationml/2006/main">
+  <p:cSld>
+    <p:spTree>
+      <p:nvGrpSpPr>
+        <p:cNvPr id="1" name=""/>
+        <p:cNvGrpSpPr/>
+        <p:nvPr/>
+      </p:nvGrpSpPr>
+      <p:grpSpPr>
+        <a:xfrm>
+          <a:off x="0" y="0"/>
+          <a:ext cx="0" cy="0"/>
+          <a:chOff x="0" y="0"/>
+          <a:chExt cx="0" cy="0"/>
+        </a:xfrm>
+      </p:grpSpPr>
+      <p:grpSp>
+        <p:nvGrpSpPr>
+          <p:cNvPr id="2" name="Group 1">
+            <a:extLst>
+              <a:ext uri="{FF2B5EF4-FFF2-40B4-BE49-F238E27FC236}">
+                <a16:creationId xmlns:a16="http://schemas.microsoft.com/office/drawing/2014/main" id="{86A5D5CD-27DB-6F68-2CB1-84ADBC676088}"/>
+              </a:ext>
+            </a:extLst>
+          </p:cNvPr>
+          <p:cNvGrpSpPr/>
+          <p:nvPr/>
+        </p:nvGrpSpPr>
+        <p:grpSpPr>
+          <a:xfrm>
+            <a:off x="1791164" y="0"/>
+            <a:ext cx="8820150" cy="6858000"/>
+            <a:chOff x="144463" y="0"/>
+            <a:chExt cx="8820150" cy="6858000"/>
+          </a:xfrm>
+        </p:grpSpPr>
+        <p:sp>
+          <p:nvSpPr>
+            <p:cNvPr id="3" name="Arc 5" descr="Dark downward diagonal">
+              <a:extLst>
+                <a:ext uri="{FF2B5EF4-FFF2-40B4-BE49-F238E27FC236}">
+                  <a16:creationId xmlns:a16="http://schemas.microsoft.com/office/drawing/2014/main" id="{31425469-D3D8-0B5F-1B7D-A06CDFC0D208}"/>
+                </a:ext>
+              </a:extLst>
+            </p:cNvPr>
+            <p:cNvSpPr>
+              <a:spLocks/>
+            </p:cNvSpPr>
+            <p:nvPr/>
+          </p:nvSpPr>
+          <p:spPr bwMode="auto">
+            <a:xfrm rot="16200000">
+              <a:off x="3652838" y="1755775"/>
+              <a:ext cx="6408738" cy="3419475"/>
+            </a:xfrm>
+            <a:custGeom>
+              <a:avLst/>
+              <a:gdLst>
+                <a:gd name="T0" fmla="*/ 0 w 43142"/>
+                <a:gd name="T1" fmla="*/ 205 h 21600"/>
+                <a:gd name="T2" fmla="*/ 378 w 43142"/>
+                <a:gd name="T3" fmla="*/ 202 h 21600"/>
+                <a:gd name="T4" fmla="*/ 189 w 43142"/>
+                <a:gd name="T5" fmla="*/ 215 h 21600"/>
+                <a:gd name="T6" fmla="*/ 0 60000 65536"/>
+                <a:gd name="T7" fmla="*/ 0 60000 65536"/>
+                <a:gd name="T8" fmla="*/ 0 60000 65536"/>
+                <a:gd name="T9" fmla="*/ 0 w 43142"/>
+                <a:gd name="T10" fmla="*/ 0 h 21600"/>
+                <a:gd name="T11" fmla="*/ 43142 w 43142"/>
+                <a:gd name="T12" fmla="*/ 21600 h 21600"/>
+              </a:gdLst>
+              <a:ahLst/>
+              <a:cxnLst>
+                <a:cxn ang="T6">
+                  <a:pos x="T0" y="T1"/>
+                </a:cxn>
+                <a:cxn ang="T7">
+                  <a:pos x="T2" y="T3"/>
+                </a:cxn>
+                <a:cxn ang="T8">
+                  <a:pos x="T4" y="T5"/>
+                </a:cxn>
+              </a:cxnLst>
+              <a:rect l="T9" t="T10" r="T11" b="T12"/>
+              <a:pathLst>
+                <a:path w="43142" h="21600" fill="none" extrusionOk="0">
+                  <a:moveTo>
+                    <a:pt x="-1" y="20635"/>
+                  </a:moveTo>
+                  <a:cubicBezTo>
+                    <a:pt x="515" y="9093"/>
+                    <a:pt x="10023" y="-1"/>
+                    <a:pt x="21578" y="0"/>
+                  </a:cubicBezTo>
+                  <a:cubicBezTo>
+                    <a:pt x="33022" y="0"/>
+                    <a:pt x="42481" y="8927"/>
+                    <a:pt x="43141" y="20353"/>
+                  </a:cubicBezTo>
+                </a:path>
+                <a:path w="43142" h="21600" stroke="0" extrusionOk="0">
+                  <a:moveTo>
+                    <a:pt x="-1" y="20635"/>
+                  </a:moveTo>
+                  <a:cubicBezTo>
+                    <a:pt x="515" y="9093"/>
+                    <a:pt x="10023" y="-1"/>
+                    <a:pt x="21578" y="0"/>
+                  </a:cubicBezTo>
+                  <a:cubicBezTo>
+                    <a:pt x="33022" y="0"/>
+                    <a:pt x="42481" y="8927"/>
+                    <a:pt x="43141" y="20353"/>
+                  </a:cubicBezTo>
+                  <a:lnTo>
+                    <a:pt x="21578" y="21600"/>
+                  </a:lnTo>
+                  <a:close/>
+                </a:path>
+              </a:pathLst>
+            </a:custGeom>
+            <a:pattFill prst="dkDnDiag">
+              <a:fgClr>
+                <a:srgbClr val="9999FF"/>
+              </a:fgClr>
+              <a:bgClr>
+                <a:schemeClr val="bg1"/>
+              </a:bgClr>
+            </a:pattFill>
+            <a:ln w="9525">
+              <a:solidFill>
+                <a:schemeClr val="bg2"/>
+              </a:solidFill>
+              <a:round/>
+              <a:headEnd/>
+              <a:tailEnd/>
+            </a:ln>
+          </p:spPr>
+          <p:txBody>
+            <a:bodyPr wrap="none" anchor="ctr"/>
+            <a:lstStyle/>
+            <a:p>
+              <a:endParaRPr lang="id-ID" dirty="0"/>
+            </a:p>
+          </p:txBody>
+        </p:sp>
+        <p:sp>
+          <p:nvSpPr>
+            <p:cNvPr id="4" name="Arc 6">
+              <a:extLst>
+                <a:ext uri="{FF2B5EF4-FFF2-40B4-BE49-F238E27FC236}">
+                  <a16:creationId xmlns:a16="http://schemas.microsoft.com/office/drawing/2014/main" id="{F7053F89-CFF5-F727-C780-24464E1084A3}"/>
+                </a:ext>
+              </a:extLst>
+            </p:cNvPr>
+            <p:cNvSpPr>
+              <a:spLocks/>
+            </p:cNvSpPr>
+            <p:nvPr/>
+          </p:nvSpPr>
+          <p:spPr bwMode="auto">
+            <a:xfrm rot="16200000">
+              <a:off x="4103688" y="1808163"/>
+              <a:ext cx="5905500" cy="3240088"/>
+            </a:xfrm>
+            <a:custGeom>
+              <a:avLst/>
+              <a:gdLst>
+                <a:gd name="T0" fmla="*/ 0 w 43142"/>
+                <a:gd name="T1" fmla="*/ 184 h 21600"/>
+                <a:gd name="T2" fmla="*/ 321 w 43142"/>
+                <a:gd name="T3" fmla="*/ 182 h 21600"/>
+                <a:gd name="T4" fmla="*/ 160 w 43142"/>
+                <a:gd name="T5" fmla="*/ 193 h 21600"/>
+                <a:gd name="T6" fmla="*/ 0 60000 65536"/>
+                <a:gd name="T7" fmla="*/ 0 60000 65536"/>
+                <a:gd name="T8" fmla="*/ 0 60000 65536"/>
+                <a:gd name="T9" fmla="*/ 0 w 43142"/>
+                <a:gd name="T10" fmla="*/ 0 h 21600"/>
+                <a:gd name="T11" fmla="*/ 43142 w 43142"/>
+                <a:gd name="T12" fmla="*/ 21600 h 21600"/>
+              </a:gdLst>
+              <a:ahLst/>
+              <a:cxnLst>
+                <a:cxn ang="T6">
+                  <a:pos x="T0" y="T1"/>
+                </a:cxn>
+                <a:cxn ang="T7">
+                  <a:pos x="T2" y="T3"/>
+                </a:cxn>
+                <a:cxn ang="T8">
+                  <a:pos x="T4" y="T5"/>
+                </a:cxn>
+              </a:cxnLst>
+              <a:rect l="T9" t="T10" r="T11" b="T12"/>
+              <a:pathLst>
+                <a:path w="43142" h="21600" fill="none" extrusionOk="0">
+                  <a:moveTo>
+                    <a:pt x="-1" y="20635"/>
+                  </a:moveTo>
+                  <a:cubicBezTo>
+                    <a:pt x="515" y="9093"/>
+                    <a:pt x="10023" y="-1"/>
+                    <a:pt x="21578" y="0"/>
+                  </a:cubicBezTo>
+                  <a:cubicBezTo>
+                    <a:pt x="33022" y="0"/>
+                    <a:pt x="42481" y="8927"/>
+                    <a:pt x="43141" y="20353"/>
+                  </a:cubicBezTo>
+                </a:path>
+                <a:path w="43142" h="21600" stroke="0" extrusionOk="0">
+                  <a:moveTo>
+                    <a:pt x="-1" y="20635"/>
+                  </a:moveTo>
+                  <a:cubicBezTo>
+                    <a:pt x="515" y="9093"/>
+                    <a:pt x="10023" y="-1"/>
+                    <a:pt x="21578" y="0"/>
+                  </a:cubicBezTo>
+                  <a:cubicBezTo>
+                    <a:pt x="33022" y="0"/>
+                    <a:pt x="42481" y="8927"/>
+                    <a:pt x="43141" y="20353"/>
+                  </a:cubicBezTo>
+                  <a:lnTo>
+                    <a:pt x="21578" y="21600"/>
+                  </a:lnTo>
+                  <a:close/>
+                </a:path>
+              </a:pathLst>
+            </a:custGeom>
+            <a:solidFill>
+              <a:schemeClr val="bg1"/>
+            </a:solidFill>
+            <a:ln w="9525">
+              <a:noFill/>
+              <a:round/>
+              <a:headEnd/>
+              <a:tailEnd/>
+            </a:ln>
+          </p:spPr>
+          <p:txBody>
+            <a:bodyPr wrap="none" anchor="ctr"/>
+            <a:lstStyle/>
+            <a:p>
+              <a:endParaRPr lang="id-ID" dirty="0"/>
+            </a:p>
+          </p:txBody>
+        </p:sp>
+        <p:sp>
+          <p:nvSpPr>
+            <p:cNvPr id="5" name="Line 7">
+              <a:extLst>
+                <a:ext uri="{FF2B5EF4-FFF2-40B4-BE49-F238E27FC236}">
+                  <a16:creationId xmlns:a16="http://schemas.microsoft.com/office/drawing/2014/main" id="{BD8F62D7-1520-E2A1-A484-7C0F7F6543B5}"/>
+                </a:ext>
+              </a:extLst>
+            </p:cNvPr>
+            <p:cNvSpPr>
+              <a:spLocks noChangeShapeType="1"/>
+            </p:cNvSpPr>
+            <p:nvPr/>
+          </p:nvSpPr>
+          <p:spPr bwMode="auto">
+            <a:xfrm rot="5400000">
+              <a:off x="4554538" y="-1125538"/>
+              <a:ext cx="0" cy="8820150"/>
+            </a:xfrm>
+            <a:prstGeom prst="line">
+              <a:avLst/>
+            </a:prstGeom>
+            <a:noFill/>
+            <a:ln w="9525">
+              <a:solidFill>
+                <a:schemeClr val="tx1"/>
+              </a:solidFill>
+              <a:prstDash val="dash"/>
+              <a:round/>
+              <a:headEnd/>
+              <a:tailEnd/>
+            </a:ln>
+          </p:spPr>
+          <p:txBody>
+            <a:bodyPr/>
+            <a:lstStyle/>
+            <a:p>
+              <a:endParaRPr lang="id-ID"/>
+            </a:p>
+          </p:txBody>
+        </p:sp>
+        <p:sp>
+          <p:nvSpPr>
+            <p:cNvPr id="6" name="Line 8">
+              <a:extLst>
+                <a:ext uri="{FF2B5EF4-FFF2-40B4-BE49-F238E27FC236}">
+                  <a16:creationId xmlns:a16="http://schemas.microsoft.com/office/drawing/2014/main" id="{50DFAF2A-5BF8-1C47-54AB-EC7572A17D5E}"/>
+                </a:ext>
+              </a:extLst>
+            </p:cNvPr>
+            <p:cNvSpPr>
+              <a:spLocks noChangeShapeType="1"/>
+            </p:cNvSpPr>
+            <p:nvPr/>
+          </p:nvSpPr>
+          <p:spPr bwMode="auto">
+            <a:xfrm>
+              <a:off x="8532813" y="0"/>
+              <a:ext cx="0" cy="6858000"/>
+            </a:xfrm>
+            <a:prstGeom prst="line">
+              <a:avLst/>
+            </a:prstGeom>
+            <a:noFill/>
+            <a:ln w="9525">
+              <a:solidFill>
+                <a:schemeClr val="tx1"/>
+              </a:solidFill>
+              <a:prstDash val="dash"/>
+              <a:round/>
+              <a:headEnd/>
+              <a:tailEnd/>
+            </a:ln>
+          </p:spPr>
+          <p:txBody>
+            <a:bodyPr/>
+            <a:lstStyle/>
+            <a:p>
+              <a:endParaRPr lang="id-ID"/>
+            </a:p>
+          </p:txBody>
+        </p:sp>
+        <p:sp>
+          <p:nvSpPr>
+            <p:cNvPr id="7" name="Line 9">
+              <a:extLst>
+                <a:ext uri="{FF2B5EF4-FFF2-40B4-BE49-F238E27FC236}">
+                  <a16:creationId xmlns:a16="http://schemas.microsoft.com/office/drawing/2014/main" id="{E6737576-ABED-7503-3156-38211028951F}"/>
+                </a:ext>
+              </a:extLst>
+            </p:cNvPr>
+            <p:cNvSpPr>
+              <a:spLocks noChangeShapeType="1"/>
+            </p:cNvSpPr>
+            <p:nvPr/>
+          </p:nvSpPr>
+          <p:spPr bwMode="auto">
+            <a:xfrm>
+              <a:off x="7062788" y="3082925"/>
+              <a:ext cx="0" cy="431800"/>
+            </a:xfrm>
+            <a:prstGeom prst="line">
+              <a:avLst/>
+            </a:prstGeom>
+            <a:noFill/>
+            <a:ln w="9525">
+              <a:solidFill>
+                <a:schemeClr val="tx1"/>
+              </a:solidFill>
+              <a:round/>
+              <a:headEnd/>
+              <a:tailEnd/>
+            </a:ln>
+          </p:spPr>
+          <p:txBody>
+            <a:bodyPr/>
+            <a:lstStyle/>
+            <a:p>
+              <a:endParaRPr lang="id-ID"/>
+            </a:p>
+          </p:txBody>
+        </p:sp>
+        <p:sp>
+          <p:nvSpPr>
+            <p:cNvPr id="8" name="Line 10">
+              <a:extLst>
+                <a:ext uri="{FF2B5EF4-FFF2-40B4-BE49-F238E27FC236}">
+                  <a16:creationId xmlns:a16="http://schemas.microsoft.com/office/drawing/2014/main" id="{E4F34C85-A8A2-F000-45E7-A085A7B864C9}"/>
+                </a:ext>
+              </a:extLst>
+            </p:cNvPr>
+            <p:cNvSpPr>
+              <a:spLocks noChangeShapeType="1"/>
+            </p:cNvSpPr>
+            <p:nvPr/>
+          </p:nvSpPr>
+          <p:spPr bwMode="auto">
+            <a:xfrm>
+              <a:off x="2411413" y="2636838"/>
+              <a:ext cx="0" cy="647700"/>
+            </a:xfrm>
+            <a:prstGeom prst="line">
+              <a:avLst/>
+            </a:prstGeom>
+            <a:noFill/>
+            <a:ln w="57150">
+              <a:solidFill>
+                <a:srgbClr val="FF6600"/>
+              </a:solidFill>
+              <a:round/>
+              <a:headEnd type="triangle" w="med" len="med"/>
+              <a:tailEnd/>
+            </a:ln>
+          </p:spPr>
+          <p:txBody>
+            <a:bodyPr/>
+            <a:lstStyle/>
+            <a:p>
+              <a:endParaRPr lang="id-ID"/>
+            </a:p>
+          </p:txBody>
+        </p:sp>
+        <p:sp>
+          <p:nvSpPr>
+            <p:cNvPr id="9" name="Freeform 11">
+              <a:extLst>
+                <a:ext uri="{FF2B5EF4-FFF2-40B4-BE49-F238E27FC236}">
+                  <a16:creationId xmlns:a16="http://schemas.microsoft.com/office/drawing/2014/main" id="{C17272A0-ED11-C216-69FC-8F1CF1CCBEFD}"/>
+                </a:ext>
+              </a:extLst>
+            </p:cNvPr>
+            <p:cNvSpPr>
+              <a:spLocks/>
+            </p:cNvSpPr>
+            <p:nvPr/>
+          </p:nvSpPr>
+          <p:spPr bwMode="auto">
+            <a:xfrm>
+              <a:off x="395288" y="1916113"/>
+              <a:ext cx="4819650" cy="735013"/>
+            </a:xfrm>
+            <a:custGeom>
+              <a:avLst/>
+              <a:gdLst>
+                <a:gd name="T0" fmla="*/ 0 w 3036"/>
+                <a:gd name="T1" fmla="*/ 463 h 463"/>
+                <a:gd name="T2" fmla="*/ 3036 w 3036"/>
+                <a:gd name="T3" fmla="*/ 463 h 463"/>
+                <a:gd name="T4" fmla="*/ 1580 w 3036"/>
+                <a:gd name="T5" fmla="*/ 0 h 463"/>
+                <a:gd name="T6" fmla="*/ 0 60000 65536"/>
+                <a:gd name="T7" fmla="*/ 0 60000 65536"/>
+                <a:gd name="T8" fmla="*/ 0 60000 65536"/>
+                <a:gd name="T9" fmla="*/ 0 w 3036"/>
+                <a:gd name="T10" fmla="*/ 0 h 463"/>
+                <a:gd name="T11" fmla="*/ 3036 w 3036"/>
+                <a:gd name="T12" fmla="*/ 463 h 463"/>
+              </a:gdLst>
+              <a:ahLst/>
+              <a:cxnLst>
+                <a:cxn ang="T6">
+                  <a:pos x="T0" y="T1"/>
+                </a:cxn>
+                <a:cxn ang="T7">
+                  <a:pos x="T2" y="T3"/>
+                </a:cxn>
+                <a:cxn ang="T8">
+                  <a:pos x="T4" y="T5"/>
+                </a:cxn>
+              </a:cxnLst>
+              <a:rect l="T9" t="T10" r="T11" b="T12"/>
+              <a:pathLst>
+                <a:path w="3036" h="463">
+                  <a:moveTo>
+                    <a:pt x="0" y="463"/>
+                  </a:moveTo>
+                  <a:lnTo>
+                    <a:pt x="3036" y="463"/>
+                  </a:lnTo>
+                  <a:lnTo>
+                    <a:pt x="1580" y="0"/>
+                  </a:lnTo>
+                </a:path>
+              </a:pathLst>
+            </a:custGeom>
+            <a:noFill/>
+            <a:ln w="9525">
+              <a:solidFill>
+                <a:srgbClr val="FF6600"/>
+              </a:solidFill>
+              <a:round/>
+              <a:headEnd/>
+              <a:tailEnd type="triangle" w="med" len="med"/>
+            </a:ln>
+          </p:spPr>
+          <p:txBody>
+            <a:bodyPr/>
+            <a:lstStyle/>
+            <a:p>
+              <a:endParaRPr lang="id-ID"/>
+            </a:p>
+          </p:txBody>
+        </p:sp>
+        <p:sp>
+          <p:nvSpPr>
+            <p:cNvPr id="10" name="Line 12">
+              <a:extLst>
+                <a:ext uri="{FF2B5EF4-FFF2-40B4-BE49-F238E27FC236}">
+                  <a16:creationId xmlns:a16="http://schemas.microsoft.com/office/drawing/2014/main" id="{96C401A0-BF62-AF93-5FEE-496493E6AD63}"/>
+                </a:ext>
+              </a:extLst>
+            </p:cNvPr>
+            <p:cNvSpPr>
+              <a:spLocks noChangeShapeType="1"/>
+            </p:cNvSpPr>
+            <p:nvPr/>
+          </p:nvSpPr>
+          <p:spPr bwMode="auto">
+            <a:xfrm>
+              <a:off x="5219701" y="2636838"/>
+              <a:ext cx="3313113" cy="1152525"/>
+            </a:xfrm>
+            <a:prstGeom prst="line">
+              <a:avLst/>
+            </a:prstGeom>
+            <a:noFill/>
+            <a:ln w="9525">
+              <a:solidFill>
+                <a:srgbClr val="FF6600"/>
+              </a:solidFill>
+              <a:prstDash val="lgDash"/>
+              <a:round/>
+              <a:headEnd/>
+              <a:tailEnd/>
+            </a:ln>
+          </p:spPr>
+          <p:txBody>
+            <a:bodyPr/>
+            <a:lstStyle/>
+            <a:p>
+              <a:endParaRPr lang="id-ID"/>
+            </a:p>
+          </p:txBody>
+        </p:sp>
+        <p:sp>
+          <p:nvSpPr>
+            <p:cNvPr id="11" name="Freeform 13">
+              <a:extLst>
+                <a:ext uri="{FF2B5EF4-FFF2-40B4-BE49-F238E27FC236}">
+                  <a16:creationId xmlns:a16="http://schemas.microsoft.com/office/drawing/2014/main" id="{B57136A4-5A0D-B3CE-D6E7-3F39B7581D81}"/>
+                </a:ext>
+              </a:extLst>
+            </p:cNvPr>
+            <p:cNvSpPr>
+              <a:spLocks/>
+            </p:cNvSpPr>
+            <p:nvPr/>
+          </p:nvSpPr>
+          <p:spPr bwMode="auto">
+            <a:xfrm>
+              <a:off x="539751" y="2349500"/>
+              <a:ext cx="4600575" cy="654050"/>
+            </a:xfrm>
+            <a:custGeom>
+              <a:avLst/>
+              <a:gdLst>
+                <a:gd name="T0" fmla="*/ 0 w 2898"/>
+                <a:gd name="T1" fmla="*/ 0 h 412"/>
+                <a:gd name="T2" fmla="*/ 2898 w 2898"/>
+                <a:gd name="T3" fmla="*/ 412 h 412"/>
+                <a:gd name="T4" fmla="*/ 0 60000 65536"/>
+                <a:gd name="T5" fmla="*/ 0 60000 65536"/>
+                <a:gd name="T6" fmla="*/ 0 w 2898"/>
+                <a:gd name="T7" fmla="*/ 0 h 412"/>
+                <a:gd name="T8" fmla="*/ 2898 w 2898"/>
+                <a:gd name="T9" fmla="*/ 412 h 412"/>
+              </a:gdLst>
+              <a:ahLst/>
+              <a:cxnLst>
+                <a:cxn ang="T4">
+                  <a:pos x="T0" y="T1"/>
+                </a:cxn>
+                <a:cxn ang="T5">
+                  <a:pos x="T2" y="T3"/>
+                </a:cxn>
+              </a:cxnLst>
+              <a:rect l="T6" t="T7" r="T8" b="T9"/>
+              <a:pathLst>
+                <a:path w="2898" h="412">
+                  <a:moveTo>
+                    <a:pt x="0" y="0"/>
+                  </a:moveTo>
+                  <a:lnTo>
+                    <a:pt x="2898" y="412"/>
+                  </a:lnTo>
+                </a:path>
+              </a:pathLst>
+            </a:custGeom>
+            <a:noFill/>
+            <a:ln w="9525">
+              <a:solidFill>
+                <a:srgbClr val="FF6600"/>
+              </a:solidFill>
+              <a:round/>
+              <a:headEnd/>
+              <a:tailEnd/>
+            </a:ln>
+          </p:spPr>
+          <p:txBody>
+            <a:bodyPr/>
+            <a:lstStyle/>
+            <a:p>
+              <a:endParaRPr lang="id-ID"/>
+            </a:p>
+          </p:txBody>
+        </p:sp>
+        <p:sp>
+          <p:nvSpPr>
+            <p:cNvPr id="12" name="Line 14">
+              <a:extLst>
+                <a:ext uri="{FF2B5EF4-FFF2-40B4-BE49-F238E27FC236}">
+                  <a16:creationId xmlns:a16="http://schemas.microsoft.com/office/drawing/2014/main" id="{B085427F-26E9-CD1B-5F17-F45807677F5F}"/>
+                </a:ext>
+              </a:extLst>
+            </p:cNvPr>
+            <p:cNvSpPr>
+              <a:spLocks noChangeShapeType="1"/>
+            </p:cNvSpPr>
+            <p:nvPr/>
+          </p:nvSpPr>
+          <p:spPr bwMode="auto">
+            <a:xfrm>
+              <a:off x="5148263" y="2997200"/>
+              <a:ext cx="2736850" cy="0"/>
+            </a:xfrm>
+            <a:prstGeom prst="line">
+              <a:avLst/>
+            </a:prstGeom>
+            <a:noFill/>
+            <a:ln w="9525">
+              <a:solidFill>
+                <a:srgbClr val="FF6600"/>
+              </a:solidFill>
+              <a:prstDash val="lgDash"/>
+              <a:round/>
+              <a:headEnd/>
+              <a:tailEnd/>
+            </a:ln>
+          </p:spPr>
+          <p:txBody>
+            <a:bodyPr/>
+            <a:lstStyle/>
+            <a:p>
+              <a:endParaRPr lang="id-ID"/>
+            </a:p>
+          </p:txBody>
+        </p:sp>
+        <p:sp>
+          <p:nvSpPr>
+            <p:cNvPr id="13" name="Line 15">
+              <a:extLst>
+                <a:ext uri="{FF2B5EF4-FFF2-40B4-BE49-F238E27FC236}">
+                  <a16:creationId xmlns:a16="http://schemas.microsoft.com/office/drawing/2014/main" id="{57197452-5790-A55C-83AE-C327B58AF774}"/>
+                </a:ext>
+              </a:extLst>
+            </p:cNvPr>
+            <p:cNvSpPr>
+              <a:spLocks noChangeShapeType="1"/>
+            </p:cNvSpPr>
+            <p:nvPr/>
+          </p:nvSpPr>
+          <p:spPr bwMode="auto">
+            <a:xfrm flipV="1">
+              <a:off x="6227763" y="2997200"/>
+              <a:ext cx="0" cy="287338"/>
+            </a:xfrm>
+            <a:prstGeom prst="line">
+              <a:avLst/>
+            </a:prstGeom>
+            <a:noFill/>
+            <a:ln w="38100">
+              <a:solidFill>
+                <a:srgbClr val="FF6600"/>
+              </a:solidFill>
+              <a:round/>
+              <a:headEnd/>
+              <a:tailEnd type="triangle" w="med" len="med"/>
+            </a:ln>
+          </p:spPr>
+          <p:txBody>
+            <a:bodyPr/>
+            <a:lstStyle/>
+            <a:p>
+              <a:endParaRPr lang="id-ID"/>
+            </a:p>
+          </p:txBody>
+        </p:sp>
+      </p:grpSp>
+    </p:spTree>
+    <p:extLst>
+      <p:ext uri="{BB962C8B-B14F-4D97-AF65-F5344CB8AC3E}">
+        <p14:creationId xmlns:p14="http://schemas.microsoft.com/office/powerpoint/2010/main" val="1580378846"/>
+      </p:ext>
+    </p:extLst>
+  </p:cSld>
+  <p:clrMapOvr>
+    <a:masterClrMapping/>
+  </p:clrMapOvr>
+  <p:timing>
+    <p:tnLst>
+      <p:par>
+        <p:cTn id="1" dur="indefinite" restart="never" nodeType="tmRoot">
+          <p:childTnLst>
+            <p:seq concurrent="1" nextAc="seek">
+              <p:cTn id="2" dur="indefinite" nodeType="mainSeq">
+                <p:childTnLst>
+                  <p:par>
+                    <p:cTn id="3" fill="hold">
+                      <p:stCondLst>
+                        <p:cond delay="indefinite"/>
+                      </p:stCondLst>
+                      <p:childTnLst>
+                        <p:par>
+                          <p:cTn id="4" fill="hold">
+                            <p:stCondLst>
+                              <p:cond delay="0"/>
+                            </p:stCondLst>
+                            <p:childTnLst>
+                              <p:par>
+                                <p:cTn id="5" presetID="3" presetClass="entr" presetSubtype="10" fill="hold" nodeType="clickEffect">
+                                  <p:stCondLst>
+                                    <p:cond delay="0"/>
+                                  </p:stCondLst>
+                                  <p:childTnLst>
+                                    <p:set>
+                                      <p:cBhvr>
+                                        <p:cTn id="6" dur="1" fill="hold">
+                                          <p:stCondLst>
+                                            <p:cond delay="0"/>
+                                          </p:stCondLst>
+                                        </p:cTn>
+                                        <p:tgtEl>
+                                          <p:spTgt spid="2"/>
+                                        </p:tgtEl>
+                                        <p:attrNameLst>
+                                          <p:attrName>style.visibility</p:attrName>
+                                        </p:attrNameLst>
+                                      </p:cBhvr>
+                                      <p:to>
+                                        <p:strVal val="visible"/>
+                                      </p:to>
+                                    </p:set>
+                                    <p:animEffect transition="in" filter="blinds(horizontal)">
+                                      <p:cBhvr>
+                                        <p:cTn id="7" dur="500"/>
+                                        <p:tgtEl>
+                                          <p:spTgt spid="2"/>
+                                        </p:tgtEl>
+                                      </p:cBhvr>
+                                    </p:animEffect>
+                                  </p:childTnLst>
+                                </p:cTn>
+                              </p:par>
+                            </p:childTnLst>
+                          </p:cTn>
+                        </p:par>
+                      </p:childTnLst>
+                    </p:cTn>
+                  </p:par>
+                </p:childTnLst>
+              </p:cTn>
+              <p:prevCondLst>
+                <p:cond evt="onPrev" delay="0">
+                  <p:tgtEl>
+                    <p:sldTgt/>
+                  </p:tgtEl>
+                </p:cond>
+              </p:prevCondLst>
+              <p:nextCondLst>
+                <p:cond evt="onNext" delay="0">
+                  <p:tgtEl>
+                    <p:sldTgt/>
+                  </p:tgtEl>
+                </p:cond>
+              </p:nextCondLst>
+            </p:seq>
+          </p:childTnLst>
+        </p:cTn>
+      </p:par>
+    </p:tnLst>
+  </p:timing>
+</p:sld>
+</file>
+
+<file path=ppt/slides/slide5.xml><?xml version="1.0" encoding="utf-8"?>
 <p:sld xmlns:a="http://schemas.openxmlformats.org/drawingml/2006/main" xmlns:r="http://schemas.openxmlformats.org/officeDocument/2006/relationships" xmlns:p="http://schemas.openxmlformats.org/presentationml/2006/main">
   <p:cSld>
     <p:spTree>
@@ -5932,7 +9019,7 @@
 </p:sld>
 </file>
 
-<file path=ppt/slides/slide3.xml><?xml version="1.0" encoding="utf-8"?>
+<file path=ppt/slides/slide6.xml><?xml version="1.0" encoding="utf-8"?>
 <p:sld xmlns:a="http://schemas.openxmlformats.org/drawingml/2006/main" xmlns:r="http://schemas.openxmlformats.org/officeDocument/2006/relationships" xmlns:p="http://schemas.openxmlformats.org/presentationml/2006/main">
   <p:cSld>
     <p:spTree>
@@ -6855,8 +9942,8 @@
                   </a:p>
                 </p:txBody>
               </p:sp>
-              <mc:AlternateContent xmlns:mc="http://schemas.openxmlformats.org/markup-compatibility/2006">
-                <mc:Choice xmlns:a14="http://schemas.microsoft.com/office/drawing/2010/main" Requires="a14">
+              <mc:AlternateContent xmlns:mc="http://schemas.openxmlformats.org/markup-compatibility/2006" xmlns:a14="http://schemas.microsoft.com/office/drawing/2010/main">
+                <mc:Choice Requires="a14">
                   <p:sp>
                     <p:nvSpPr>
                       <p:cNvPr id="57" name="TextBox 56">
@@ -6912,7 +9999,7 @@
                     </p:txBody>
                   </p:sp>
                 </mc:Choice>
-                <mc:Fallback>
+                <mc:Fallback xmlns="">
                   <p:sp>
                     <p:nvSpPr>
                       <p:cNvPr id="57" name="TextBox 56">
@@ -6957,8 +10044,8 @@
                   </p:sp>
                 </mc:Fallback>
               </mc:AlternateContent>
-              <mc:AlternateContent xmlns:mc="http://schemas.openxmlformats.org/markup-compatibility/2006">
-                <mc:Choice xmlns:a14="http://schemas.microsoft.com/office/drawing/2010/main" Requires="a14">
+              <mc:AlternateContent xmlns:mc="http://schemas.openxmlformats.org/markup-compatibility/2006" xmlns:a14="http://schemas.microsoft.com/office/drawing/2010/main">
+                <mc:Choice Requires="a14">
                   <p:sp>
                     <p:nvSpPr>
                       <p:cNvPr id="61" name="TextBox 60">
@@ -7014,7 +10101,7 @@
                     </p:txBody>
                   </p:sp>
                 </mc:Choice>
-                <mc:Fallback>
+                <mc:Fallback xmlns="">
                   <p:sp>
                     <p:nvSpPr>
                       <p:cNvPr id="61" name="TextBox 60">
@@ -7416,7 +10503,7 @@
 </p:sld>
 </file>
 
-<file path=ppt/slides/slide4.xml><?xml version="1.0" encoding="utf-8"?>
+<file path=ppt/slides/slide7.xml><?xml version="1.0" encoding="utf-8"?>
 <p:sld xmlns:a="http://schemas.openxmlformats.org/drawingml/2006/main" xmlns:r="http://schemas.openxmlformats.org/officeDocument/2006/relationships" xmlns:p="http://schemas.openxmlformats.org/presentationml/2006/main">
   <p:cSld>
     <p:spTree>

</xml_diff>

<commit_message>
Menambahkan bayangan cermin cekung
</commit_message>
<xml_diff>
--- a/Presentation1.pptx
+++ b/Presentation1.pptx
@@ -6,12 +6,14 @@
   </p:sldMasterIdLst>
   <p:sldIdLst>
     <p:sldId id="256" r:id="rId2"/>
-    <p:sldId id="260" r:id="rId3"/>
-    <p:sldId id="262" r:id="rId4"/>
-    <p:sldId id="261" r:id="rId5"/>
-    <p:sldId id="257" r:id="rId6"/>
-    <p:sldId id="258" r:id="rId7"/>
-    <p:sldId id="259" r:id="rId8"/>
+    <p:sldId id="263" r:id="rId3"/>
+    <p:sldId id="264" r:id="rId4"/>
+    <p:sldId id="260" r:id="rId5"/>
+    <p:sldId id="262" r:id="rId6"/>
+    <p:sldId id="261" r:id="rId7"/>
+    <p:sldId id="257" r:id="rId8"/>
+    <p:sldId id="258" r:id="rId9"/>
+    <p:sldId id="259" r:id="rId10"/>
   </p:sldIdLst>
   <p:sldSz cx="12192000" cy="6858000"/>
   <p:notesSz cx="6858000" cy="9144000"/>
@@ -267,7 +269,7 @@
           <a:p>
             <a:fld id="{A5358068-B55E-472E-8EF6-2EE20D143D55}" type="datetimeFigureOut">
               <a:rPr lang="en-ID" smtClean="0"/>
-              <a:t>11/08/2024</a:t>
+              <a:t>12/08/2024</a:t>
             </a:fld>
             <a:endParaRPr lang="en-ID"/>
           </a:p>
@@ -467,7 +469,7 @@
           <a:p>
             <a:fld id="{A5358068-B55E-472E-8EF6-2EE20D143D55}" type="datetimeFigureOut">
               <a:rPr lang="en-ID" smtClean="0"/>
-              <a:t>11/08/2024</a:t>
+              <a:t>12/08/2024</a:t>
             </a:fld>
             <a:endParaRPr lang="en-ID"/>
           </a:p>
@@ -677,7 +679,7 @@
           <a:p>
             <a:fld id="{A5358068-B55E-472E-8EF6-2EE20D143D55}" type="datetimeFigureOut">
               <a:rPr lang="en-ID" smtClean="0"/>
-              <a:t>11/08/2024</a:t>
+              <a:t>12/08/2024</a:t>
             </a:fld>
             <a:endParaRPr lang="en-ID"/>
           </a:p>
@@ -877,7 +879,7 @@
           <a:p>
             <a:fld id="{A5358068-B55E-472E-8EF6-2EE20D143D55}" type="datetimeFigureOut">
               <a:rPr lang="en-ID" smtClean="0"/>
-              <a:t>11/08/2024</a:t>
+              <a:t>12/08/2024</a:t>
             </a:fld>
             <a:endParaRPr lang="en-ID"/>
           </a:p>
@@ -1153,7 +1155,7 @@
           <a:p>
             <a:fld id="{A5358068-B55E-472E-8EF6-2EE20D143D55}" type="datetimeFigureOut">
               <a:rPr lang="en-ID" smtClean="0"/>
-              <a:t>11/08/2024</a:t>
+              <a:t>12/08/2024</a:t>
             </a:fld>
             <a:endParaRPr lang="en-ID"/>
           </a:p>
@@ -1421,7 +1423,7 @@
           <a:p>
             <a:fld id="{A5358068-B55E-472E-8EF6-2EE20D143D55}" type="datetimeFigureOut">
               <a:rPr lang="en-ID" smtClean="0"/>
-              <a:t>11/08/2024</a:t>
+              <a:t>12/08/2024</a:t>
             </a:fld>
             <a:endParaRPr lang="en-ID"/>
           </a:p>
@@ -1836,7 +1838,7 @@
           <a:p>
             <a:fld id="{A5358068-B55E-472E-8EF6-2EE20D143D55}" type="datetimeFigureOut">
               <a:rPr lang="en-ID" smtClean="0"/>
-              <a:t>11/08/2024</a:t>
+              <a:t>12/08/2024</a:t>
             </a:fld>
             <a:endParaRPr lang="en-ID"/>
           </a:p>
@@ -1978,7 +1980,7 @@
           <a:p>
             <a:fld id="{A5358068-B55E-472E-8EF6-2EE20D143D55}" type="datetimeFigureOut">
               <a:rPr lang="en-ID" smtClean="0"/>
-              <a:t>11/08/2024</a:t>
+              <a:t>12/08/2024</a:t>
             </a:fld>
             <a:endParaRPr lang="en-ID"/>
           </a:p>
@@ -2091,7 +2093,7 @@
           <a:p>
             <a:fld id="{A5358068-B55E-472E-8EF6-2EE20D143D55}" type="datetimeFigureOut">
               <a:rPr lang="en-ID" smtClean="0"/>
-              <a:t>11/08/2024</a:t>
+              <a:t>12/08/2024</a:t>
             </a:fld>
             <a:endParaRPr lang="en-ID"/>
           </a:p>
@@ -2404,7 +2406,7 @@
           <a:p>
             <a:fld id="{A5358068-B55E-472E-8EF6-2EE20D143D55}" type="datetimeFigureOut">
               <a:rPr lang="en-ID" smtClean="0"/>
-              <a:t>11/08/2024</a:t>
+              <a:t>12/08/2024</a:t>
             </a:fld>
             <a:endParaRPr lang="en-ID"/>
           </a:p>
@@ -2693,7 +2695,7 @@
           <a:p>
             <a:fld id="{A5358068-B55E-472E-8EF6-2EE20D143D55}" type="datetimeFigureOut">
               <a:rPr lang="en-ID" smtClean="0"/>
-              <a:t>11/08/2024</a:t>
+              <a:t>12/08/2024</a:t>
             </a:fld>
             <a:endParaRPr lang="en-ID"/>
           </a:p>
@@ -2936,7 +2938,7 @@
           <a:p>
             <a:fld id="{A5358068-B55E-472E-8EF6-2EE20D143D55}" type="datetimeFigureOut">
               <a:rPr lang="en-ID" smtClean="0"/>
-              <a:t>11/08/2024</a:t>
+              <a:t>12/08/2024</a:t>
             </a:fld>
             <a:endParaRPr lang="en-ID"/>
           </a:p>
@@ -3417,6 +3419,542 @@
 </file>
 
 <file path=ppt/slides/slide2.xml><?xml version="1.0" encoding="utf-8"?>
+<p:sld xmlns:a="http://schemas.openxmlformats.org/drawingml/2006/main" xmlns:r="http://schemas.openxmlformats.org/officeDocument/2006/relationships" xmlns:p="http://schemas.openxmlformats.org/presentationml/2006/main">
+  <p:cSld>
+    <p:spTree>
+      <p:nvGrpSpPr>
+        <p:cNvPr id="1" name=""/>
+        <p:cNvGrpSpPr/>
+        <p:nvPr/>
+      </p:nvGrpSpPr>
+      <p:grpSpPr>
+        <a:xfrm>
+          <a:off x="0" y="0"/>
+          <a:ext cx="0" cy="0"/>
+          <a:chOff x="0" y="0"/>
+          <a:chExt cx="0" cy="0"/>
+        </a:xfrm>
+      </p:grpSpPr>
+      <p:grpSp>
+        <p:nvGrpSpPr>
+          <p:cNvPr id="6" name="Group 5">
+            <a:extLst>
+              <a:ext uri="{FF2B5EF4-FFF2-40B4-BE49-F238E27FC236}">
+                <a16:creationId xmlns:a16="http://schemas.microsoft.com/office/drawing/2014/main" id="{83322A1E-1F09-EE44-D500-2A7BC3215508}"/>
+              </a:ext>
+            </a:extLst>
+          </p:cNvPr>
+          <p:cNvGrpSpPr/>
+          <p:nvPr/>
+        </p:nvGrpSpPr>
+        <p:grpSpPr>
+          <a:xfrm>
+            <a:off x="2667000" y="0"/>
+            <a:ext cx="6858000" cy="6858000"/>
+            <a:chOff x="2667000" y="0"/>
+            <a:chExt cx="6858000" cy="6858000"/>
+          </a:xfrm>
+        </p:grpSpPr>
+        <p:pic>
+          <p:nvPicPr>
+            <p:cNvPr id="3" name="Picture 2">
+              <a:extLst>
+                <a:ext uri="{FF2B5EF4-FFF2-40B4-BE49-F238E27FC236}">
+                  <a16:creationId xmlns:a16="http://schemas.microsoft.com/office/drawing/2014/main" id="{C485EB77-8C95-DB97-8861-6384D65F4845}"/>
+                </a:ext>
+              </a:extLst>
+            </p:cNvPr>
+            <p:cNvPicPr>
+              <a:picLocks noChangeAspect="1"/>
+            </p:cNvPicPr>
+            <p:nvPr/>
+          </p:nvPicPr>
+          <p:blipFill>
+            <a:blip r:embed="rId2">
+              <a:extLst>
+                <a:ext uri="{28A0092B-C50C-407E-A947-70E740481C1C}">
+                  <a14:useLocalDpi xmlns:a14="http://schemas.microsoft.com/office/drawing/2010/main" val="0"/>
+                </a:ext>
+              </a:extLst>
+            </a:blip>
+            <a:stretch>
+              <a:fillRect/>
+            </a:stretch>
+          </p:blipFill>
+          <p:spPr>
+            <a:xfrm>
+              <a:off x="2667000" y="0"/>
+              <a:ext cx="6858000" cy="6858000"/>
+            </a:xfrm>
+            <a:prstGeom prst="rect">
+              <a:avLst/>
+            </a:prstGeom>
+          </p:spPr>
+        </p:pic>
+        <p:sp>
+          <p:nvSpPr>
+            <p:cNvPr id="4" name="Rectangle 3">
+              <a:extLst>
+                <a:ext uri="{FF2B5EF4-FFF2-40B4-BE49-F238E27FC236}">
+                  <a16:creationId xmlns:a16="http://schemas.microsoft.com/office/drawing/2014/main" id="{E59EB618-9A18-AD95-4A7A-09E2B986AE2F}"/>
+                </a:ext>
+              </a:extLst>
+            </p:cNvPr>
+            <p:cNvSpPr/>
+            <p:nvPr/>
+          </p:nvSpPr>
+          <p:spPr>
+            <a:xfrm>
+              <a:off x="4567084" y="1258529"/>
+              <a:ext cx="3057832" cy="3057832"/>
+            </a:xfrm>
+            <a:prstGeom prst="rect">
+              <a:avLst/>
+            </a:prstGeom>
+            <a:noFill/>
+            <a:ln w="79375">
+              <a:solidFill>
+                <a:srgbClr val="FF0000"/>
+              </a:solidFill>
+              <a:prstDash val="sysDash"/>
+            </a:ln>
+          </p:spPr>
+          <p:style>
+            <a:lnRef idx="2">
+              <a:schemeClr val="accent1">
+                <a:shade val="15000"/>
+              </a:schemeClr>
+            </a:lnRef>
+            <a:fillRef idx="1">
+              <a:schemeClr val="accent1"/>
+            </a:fillRef>
+            <a:effectRef idx="0">
+              <a:schemeClr val="accent1"/>
+            </a:effectRef>
+            <a:fontRef idx="minor">
+              <a:schemeClr val="lt1"/>
+            </a:fontRef>
+          </p:style>
+          <p:txBody>
+            <a:bodyPr rtlCol="0" anchor="ctr"/>
+            <a:lstStyle/>
+            <a:p>
+              <a:pPr algn="ctr"/>
+              <a:endParaRPr lang="en-ID"/>
+            </a:p>
+          </p:txBody>
+        </p:sp>
+        <p:sp>
+          <p:nvSpPr>
+            <p:cNvPr id="5" name="TextBox 4">
+              <a:extLst>
+                <a:ext uri="{FF2B5EF4-FFF2-40B4-BE49-F238E27FC236}">
+                  <a16:creationId xmlns:a16="http://schemas.microsoft.com/office/drawing/2014/main" id="{7F800804-40CF-B866-18AA-F6E90238295D}"/>
+                </a:ext>
+              </a:extLst>
+            </p:cNvPr>
+            <p:cNvSpPr txBox="1"/>
+            <p:nvPr/>
+          </p:nvSpPr>
+          <p:spPr>
+            <a:xfrm>
+              <a:off x="4567084" y="647121"/>
+              <a:ext cx="3057832" cy="461665"/>
+            </a:xfrm>
+            <a:prstGeom prst="rect">
+              <a:avLst/>
+            </a:prstGeom>
+            <a:noFill/>
+          </p:spPr>
+          <p:txBody>
+            <a:bodyPr wrap="square" rtlCol="0">
+              <a:spAutoFit/>
+            </a:bodyPr>
+            <a:lstStyle/>
+            <a:p>
+              <a:pPr algn="ctr"/>
+              <a:r>
+                <a:rPr lang="en-US" sz="2400" dirty="0" err="1">
+                  <a:solidFill>
+                    <a:schemeClr val="bg1"/>
+                  </a:solidFill>
+                  <a:latin typeface="Times New Roman" panose="02020603050405020304" pitchFamily="18" charset="0"/>
+                  <a:cs typeface="Times New Roman" panose="02020603050405020304" pitchFamily="18" charset="0"/>
+                </a:rPr>
+                <a:t>Bayangan</a:t>
+              </a:r>
+              <a:r>
+                <a:rPr lang="en-US" sz="2400" dirty="0">
+                  <a:solidFill>
+                    <a:schemeClr val="bg1"/>
+                  </a:solidFill>
+                  <a:latin typeface="Times New Roman" panose="02020603050405020304" pitchFamily="18" charset="0"/>
+                  <a:cs typeface="Times New Roman" panose="02020603050405020304" pitchFamily="18" charset="0"/>
+                </a:rPr>
+                <a:t> Maya</a:t>
+              </a:r>
+              <a:endParaRPr lang="en-ID" sz="2400" dirty="0">
+                <a:solidFill>
+                  <a:schemeClr val="bg1"/>
+                </a:solidFill>
+                <a:latin typeface="Times New Roman" panose="02020603050405020304" pitchFamily="18" charset="0"/>
+                <a:cs typeface="Times New Roman" panose="02020603050405020304" pitchFamily="18" charset="0"/>
+              </a:endParaRPr>
+            </a:p>
+          </p:txBody>
+        </p:sp>
+      </p:grpSp>
+    </p:spTree>
+    <p:extLst>
+      <p:ext uri="{BB962C8B-B14F-4D97-AF65-F5344CB8AC3E}">
+        <p14:creationId xmlns:p14="http://schemas.microsoft.com/office/powerpoint/2010/main" val="1578011518"/>
+      </p:ext>
+    </p:extLst>
+  </p:cSld>
+  <p:clrMapOvr>
+    <a:masterClrMapping/>
+  </p:clrMapOvr>
+</p:sld>
+</file>
+
+<file path=ppt/slides/slide3.xml><?xml version="1.0" encoding="utf-8"?>
+<p:sld xmlns:a="http://schemas.openxmlformats.org/drawingml/2006/main" xmlns:r="http://schemas.openxmlformats.org/officeDocument/2006/relationships" xmlns:p="http://schemas.openxmlformats.org/presentationml/2006/main">
+  <p:cSld>
+    <p:spTree>
+      <p:nvGrpSpPr>
+        <p:cNvPr id="1" name=""/>
+        <p:cNvGrpSpPr/>
+        <p:nvPr/>
+      </p:nvGrpSpPr>
+      <p:grpSpPr>
+        <a:xfrm>
+          <a:off x="0" y="0"/>
+          <a:ext cx="0" cy="0"/>
+          <a:chOff x="0" y="0"/>
+          <a:chExt cx="0" cy="0"/>
+        </a:xfrm>
+      </p:grpSpPr>
+      <p:grpSp>
+        <p:nvGrpSpPr>
+          <p:cNvPr id="6" name="Group 5">
+            <a:extLst>
+              <a:ext uri="{FF2B5EF4-FFF2-40B4-BE49-F238E27FC236}">
+                <a16:creationId xmlns:a16="http://schemas.microsoft.com/office/drawing/2014/main" id="{A225F196-520A-6F5D-263A-328CB008D7D5}"/>
+              </a:ext>
+            </a:extLst>
+          </p:cNvPr>
+          <p:cNvGrpSpPr/>
+          <p:nvPr/>
+        </p:nvGrpSpPr>
+        <p:grpSpPr>
+          <a:xfrm>
+            <a:off x="3135367" y="0"/>
+            <a:ext cx="6858000" cy="6858000"/>
+            <a:chOff x="3135367" y="0"/>
+            <a:chExt cx="6858000" cy="6858000"/>
+          </a:xfrm>
+        </p:grpSpPr>
+        <p:pic>
+          <p:nvPicPr>
+            <p:cNvPr id="3" name="Picture 2">
+              <a:extLst>
+                <a:ext uri="{FF2B5EF4-FFF2-40B4-BE49-F238E27FC236}">
+                  <a16:creationId xmlns:a16="http://schemas.microsoft.com/office/drawing/2014/main" id="{9E923D3C-27B1-35BF-AF0A-42942B41148C}"/>
+                </a:ext>
+              </a:extLst>
+            </p:cNvPr>
+            <p:cNvPicPr>
+              <a:picLocks noChangeAspect="1"/>
+            </p:cNvPicPr>
+            <p:nvPr/>
+          </p:nvPicPr>
+          <p:blipFill rotWithShape="1">
+            <a:blip r:embed="rId2">
+              <a:extLst>
+                <a:ext uri="{28A0092B-C50C-407E-A947-70E740481C1C}">
+                  <a14:useLocalDpi xmlns:a14="http://schemas.microsoft.com/office/drawing/2010/main" val="0"/>
+                </a:ext>
+              </a:extLst>
+            </a:blip>
+            <a:srcRect l="305" r="355" b="23544"/>
+            <a:stretch/>
+          </p:blipFill>
+          <p:spPr>
+            <a:xfrm>
+              <a:off x="3135367" y="0"/>
+              <a:ext cx="6858000" cy="6858000"/>
+            </a:xfrm>
+            <a:prstGeom prst="rect">
+              <a:avLst/>
+            </a:prstGeom>
+          </p:spPr>
+        </p:pic>
+        <p:sp>
+          <p:nvSpPr>
+            <p:cNvPr id="4" name="Rectangle 3">
+              <a:extLst>
+                <a:ext uri="{FF2B5EF4-FFF2-40B4-BE49-F238E27FC236}">
+                  <a16:creationId xmlns:a16="http://schemas.microsoft.com/office/drawing/2014/main" id="{6A53FC7C-D66F-2E0A-8236-B272C4F978F9}"/>
+                </a:ext>
+              </a:extLst>
+            </p:cNvPr>
+            <p:cNvSpPr/>
+            <p:nvPr/>
+          </p:nvSpPr>
+          <p:spPr>
+            <a:xfrm>
+              <a:off x="4661677" y="1636902"/>
+              <a:ext cx="3057832" cy="3057832"/>
+            </a:xfrm>
+            <a:prstGeom prst="rect">
+              <a:avLst/>
+            </a:prstGeom>
+            <a:noFill/>
+            <a:ln w="79375">
+              <a:solidFill>
+                <a:srgbClr val="FF0000"/>
+              </a:solidFill>
+              <a:prstDash val="sysDash"/>
+            </a:ln>
+          </p:spPr>
+          <p:style>
+            <a:lnRef idx="2">
+              <a:schemeClr val="accent1">
+                <a:shade val="15000"/>
+              </a:schemeClr>
+            </a:lnRef>
+            <a:fillRef idx="1">
+              <a:schemeClr val="accent1"/>
+            </a:fillRef>
+            <a:effectRef idx="0">
+              <a:schemeClr val="accent1"/>
+            </a:effectRef>
+            <a:fontRef idx="minor">
+              <a:schemeClr val="lt1"/>
+            </a:fontRef>
+          </p:style>
+          <p:txBody>
+            <a:bodyPr rtlCol="0" anchor="ctr"/>
+            <a:lstStyle/>
+            <a:p>
+              <a:pPr algn="ctr"/>
+              <a:endParaRPr lang="en-ID"/>
+            </a:p>
+          </p:txBody>
+        </p:sp>
+        <p:sp>
+          <p:nvSpPr>
+            <p:cNvPr id="5" name="TextBox 4">
+              <a:extLst>
+                <a:ext uri="{FF2B5EF4-FFF2-40B4-BE49-F238E27FC236}">
+                  <a16:creationId xmlns:a16="http://schemas.microsoft.com/office/drawing/2014/main" id="{6D72D240-C05E-A3E3-6F52-9D96A3C4B387}"/>
+                </a:ext>
+              </a:extLst>
+            </p:cNvPr>
+            <p:cNvSpPr txBox="1"/>
+            <p:nvPr/>
+          </p:nvSpPr>
+          <p:spPr>
+            <a:xfrm>
+              <a:off x="4661677" y="1025494"/>
+              <a:ext cx="3057832" cy="461665"/>
+            </a:xfrm>
+            <a:prstGeom prst="rect">
+              <a:avLst/>
+            </a:prstGeom>
+            <a:noFill/>
+          </p:spPr>
+          <p:txBody>
+            <a:bodyPr wrap="square" rtlCol="0">
+              <a:spAutoFit/>
+            </a:bodyPr>
+            <a:lstStyle/>
+            <a:p>
+              <a:pPr algn="ctr"/>
+              <a:r>
+                <a:rPr lang="en-US" sz="2400" dirty="0" err="1">
+                  <a:solidFill>
+                    <a:schemeClr val="bg1"/>
+                  </a:solidFill>
+                  <a:latin typeface="Times New Roman" panose="02020603050405020304" pitchFamily="18" charset="0"/>
+                  <a:cs typeface="Times New Roman" panose="02020603050405020304" pitchFamily="18" charset="0"/>
+                </a:rPr>
+                <a:t>Bayangan</a:t>
+              </a:r>
+              <a:r>
+                <a:rPr lang="en-US" sz="2400" dirty="0">
+                  <a:solidFill>
+                    <a:schemeClr val="bg1"/>
+                  </a:solidFill>
+                  <a:latin typeface="Times New Roman" panose="02020603050405020304" pitchFamily="18" charset="0"/>
+                  <a:cs typeface="Times New Roman" panose="02020603050405020304" pitchFamily="18" charset="0"/>
+                </a:rPr>
+                <a:t> </a:t>
+              </a:r>
+              <a:r>
+                <a:rPr lang="en-US" sz="2400" dirty="0" err="1">
+                  <a:solidFill>
+                    <a:schemeClr val="bg1"/>
+                  </a:solidFill>
+                  <a:latin typeface="Times New Roman" panose="02020603050405020304" pitchFamily="18" charset="0"/>
+                  <a:cs typeface="Times New Roman" panose="02020603050405020304" pitchFamily="18" charset="0"/>
+                </a:rPr>
+                <a:t>Nyata</a:t>
+              </a:r>
+              <a:endParaRPr lang="en-ID" sz="2400" dirty="0">
+                <a:solidFill>
+                  <a:schemeClr val="bg1"/>
+                </a:solidFill>
+                <a:latin typeface="Times New Roman" panose="02020603050405020304" pitchFamily="18" charset="0"/>
+                <a:cs typeface="Times New Roman" panose="02020603050405020304" pitchFamily="18" charset="0"/>
+              </a:endParaRPr>
+            </a:p>
+          </p:txBody>
+        </p:sp>
+        <p:sp>
+          <p:nvSpPr>
+            <p:cNvPr id="7" name="TextBox 6">
+              <a:extLst>
+                <a:ext uri="{FF2B5EF4-FFF2-40B4-BE49-F238E27FC236}">
+                  <a16:creationId xmlns:a16="http://schemas.microsoft.com/office/drawing/2014/main" id="{AE5AB466-44CF-4418-E0AF-6856D6AD1679}"/>
+                </a:ext>
+              </a:extLst>
+            </p:cNvPr>
+            <p:cNvSpPr txBox="1"/>
+            <p:nvPr/>
+          </p:nvSpPr>
+          <p:spPr>
+            <a:xfrm>
+              <a:off x="7833830" y="2598003"/>
+              <a:ext cx="1884954" cy="923330"/>
+            </a:xfrm>
+            <a:prstGeom prst="rect">
+              <a:avLst/>
+            </a:prstGeom>
+            <a:noFill/>
+          </p:spPr>
+          <p:txBody>
+            <a:bodyPr wrap="square" rtlCol="0">
+              <a:spAutoFit/>
+            </a:bodyPr>
+            <a:lstStyle/>
+            <a:p>
+              <a:pPr algn="ctr"/>
+              <a:r>
+                <a:rPr lang="en-US" dirty="0" err="1">
+                  <a:solidFill>
+                    <a:schemeClr val="bg1"/>
+                  </a:solidFill>
+                  <a:latin typeface="Times New Roman" panose="02020603050405020304" pitchFamily="18" charset="0"/>
+                  <a:cs typeface="Times New Roman" panose="02020603050405020304" pitchFamily="18" charset="0"/>
+                </a:rPr>
+                <a:t>Bulan</a:t>
+              </a:r>
+              <a:r>
+                <a:rPr lang="en-US" dirty="0">
+                  <a:solidFill>
+                    <a:schemeClr val="bg1"/>
+                  </a:solidFill>
+                  <a:latin typeface="Times New Roman" panose="02020603050405020304" pitchFamily="18" charset="0"/>
+                  <a:cs typeface="Times New Roman" panose="02020603050405020304" pitchFamily="18" charset="0"/>
+                </a:rPr>
+                <a:t> dan </a:t>
+              </a:r>
+              <a:r>
+                <a:rPr lang="en-US" dirty="0" err="1">
+                  <a:solidFill>
+                    <a:schemeClr val="bg1"/>
+                  </a:solidFill>
+                  <a:latin typeface="Times New Roman" panose="02020603050405020304" pitchFamily="18" charset="0"/>
+                  <a:cs typeface="Times New Roman" panose="02020603050405020304" pitchFamily="18" charset="0"/>
+                </a:rPr>
+                <a:t>Matahari</a:t>
+              </a:r>
+              <a:r>
+                <a:rPr lang="en-US" dirty="0">
+                  <a:solidFill>
+                    <a:schemeClr val="bg1"/>
+                  </a:solidFill>
+                  <a:latin typeface="Times New Roman" panose="02020603050405020304" pitchFamily="18" charset="0"/>
+                  <a:cs typeface="Times New Roman" panose="02020603050405020304" pitchFamily="18" charset="0"/>
+                </a:rPr>
+                <a:t> </a:t>
+              </a:r>
+              <a:r>
+                <a:rPr lang="en-US" dirty="0" err="1">
+                  <a:solidFill>
+                    <a:schemeClr val="bg1"/>
+                  </a:solidFill>
+                  <a:latin typeface="Times New Roman" panose="02020603050405020304" pitchFamily="18" charset="0"/>
+                  <a:cs typeface="Times New Roman" panose="02020603050405020304" pitchFamily="18" charset="0"/>
+                </a:rPr>
+                <a:t>tampak</a:t>
+              </a:r>
+              <a:r>
+                <a:rPr lang="en-US" dirty="0">
+                  <a:solidFill>
+                    <a:schemeClr val="bg1"/>
+                  </a:solidFill>
+                  <a:latin typeface="Times New Roman" panose="02020603050405020304" pitchFamily="18" charset="0"/>
+                  <a:cs typeface="Times New Roman" panose="02020603050405020304" pitchFamily="18" charset="0"/>
+                </a:rPr>
+                <a:t> </a:t>
+              </a:r>
+              <a:r>
+                <a:rPr lang="en-US" dirty="0" err="1">
+                  <a:solidFill>
+                    <a:schemeClr val="bg1"/>
+                  </a:solidFill>
+                  <a:latin typeface="Times New Roman" panose="02020603050405020304" pitchFamily="18" charset="0"/>
+                  <a:cs typeface="Times New Roman" panose="02020603050405020304" pitchFamily="18" charset="0"/>
+                </a:rPr>
+                <a:t>lebih</a:t>
+              </a:r>
+              <a:r>
+                <a:rPr lang="en-US" dirty="0">
+                  <a:solidFill>
+                    <a:schemeClr val="bg1"/>
+                  </a:solidFill>
+                  <a:latin typeface="Times New Roman" panose="02020603050405020304" pitchFamily="18" charset="0"/>
+                  <a:cs typeface="Times New Roman" panose="02020603050405020304" pitchFamily="18" charset="0"/>
+                </a:rPr>
+                <a:t> </a:t>
+              </a:r>
+              <a:r>
+                <a:rPr lang="en-US" dirty="0" err="1">
+                  <a:solidFill>
+                    <a:schemeClr val="bg1"/>
+                  </a:solidFill>
+                  <a:latin typeface="Times New Roman" panose="02020603050405020304" pitchFamily="18" charset="0"/>
+                  <a:cs typeface="Times New Roman" panose="02020603050405020304" pitchFamily="18" charset="0"/>
+                </a:rPr>
+                <a:t>kecil</a:t>
+              </a:r>
+              <a:endParaRPr lang="en-ID" dirty="0">
+                <a:solidFill>
+                  <a:schemeClr val="bg1"/>
+                </a:solidFill>
+                <a:latin typeface="Times New Roman" panose="02020603050405020304" pitchFamily="18" charset="0"/>
+                <a:cs typeface="Times New Roman" panose="02020603050405020304" pitchFamily="18" charset="0"/>
+              </a:endParaRPr>
+            </a:p>
+          </p:txBody>
+        </p:sp>
+      </p:grpSp>
+    </p:spTree>
+    <p:extLst>
+      <p:ext uri="{BB962C8B-B14F-4D97-AF65-F5344CB8AC3E}">
+        <p14:creationId xmlns:p14="http://schemas.microsoft.com/office/powerpoint/2010/main" val="2325565469"/>
+      </p:ext>
+    </p:extLst>
+  </p:cSld>
+  <p:clrMapOvr>
+    <a:masterClrMapping/>
+  </p:clrMapOvr>
+</p:sld>
+</file>
+
+<file path=ppt/slides/slide4.xml><?xml version="1.0" encoding="utf-8"?>
 <p:sld xmlns:a="http://schemas.openxmlformats.org/drawingml/2006/main" xmlns:r="http://schemas.openxmlformats.org/officeDocument/2006/relationships" xmlns:p="http://schemas.openxmlformats.org/presentationml/2006/main">
   <p:cSld>
     <p:spTree>
@@ -4410,7 +4948,7 @@
 </p:sld>
 </file>
 
-<file path=ppt/slides/slide3.xml><?xml version="1.0" encoding="utf-8"?>
+<file path=ppt/slides/slide5.xml><?xml version="1.0" encoding="utf-8"?>
 <p:sld xmlns:a="http://schemas.openxmlformats.org/drawingml/2006/main" xmlns:r="http://schemas.openxmlformats.org/officeDocument/2006/relationships" xmlns:p="http://schemas.openxmlformats.org/presentationml/2006/main">
   <p:cSld>
     <p:spTree>
@@ -5709,7 +6247,7 @@
 </p:sld>
 </file>
 
-<file path=ppt/slides/slide4.xml><?xml version="1.0" encoding="utf-8"?>
+<file path=ppt/slides/slide6.xml><?xml version="1.0" encoding="utf-8"?>
 <p:sld xmlns:a="http://schemas.openxmlformats.org/drawingml/2006/main" xmlns:r="http://schemas.openxmlformats.org/officeDocument/2006/relationships" xmlns:p="http://schemas.openxmlformats.org/presentationml/2006/main">
   <p:cSld>
     <p:spTree>
@@ -6495,7 +7033,7 @@
 </p:sld>
 </file>
 
-<file path=ppt/slides/slide5.xml><?xml version="1.0" encoding="utf-8"?>
+<file path=ppt/slides/slide7.xml><?xml version="1.0" encoding="utf-8"?>
 <p:sld xmlns:a="http://schemas.openxmlformats.org/drawingml/2006/main" xmlns:r="http://schemas.openxmlformats.org/officeDocument/2006/relationships" xmlns:p="http://schemas.openxmlformats.org/presentationml/2006/main">
   <p:cSld>
     <p:spTree>
@@ -9019,7 +9557,7 @@
 </p:sld>
 </file>
 
-<file path=ppt/slides/slide6.xml><?xml version="1.0" encoding="utf-8"?>
+<file path=ppt/slides/slide8.xml><?xml version="1.0" encoding="utf-8"?>
 <p:sld xmlns:a="http://schemas.openxmlformats.org/drawingml/2006/main" xmlns:r="http://schemas.openxmlformats.org/officeDocument/2006/relationships" xmlns:p="http://schemas.openxmlformats.org/presentationml/2006/main">
   <p:cSld>
     <p:spTree>
@@ -10503,7 +11041,7 @@
 </p:sld>
 </file>
 
-<file path=ppt/slides/slide7.xml><?xml version="1.0" encoding="utf-8"?>
+<file path=ppt/slides/slide9.xml><?xml version="1.0" encoding="utf-8"?>
 <p:sld xmlns:a="http://schemas.openxmlformats.org/drawingml/2006/main" xmlns:r="http://schemas.openxmlformats.org/officeDocument/2006/relationships" xmlns:p="http://schemas.openxmlformats.org/presentationml/2006/main">
   <p:cSld>
     <p:spTree>

</xml_diff>